<commit_message>
Created networks for last two colonies.
</commit_message>
<xml_diff>
--- a/ant_sna_network_diagrams.pptx
+++ b/ant_sna_network_diagrams.pptx
@@ -15,10 +15,12 @@
     <p:sldId id="266" r:id="rId9"/>
     <p:sldId id="267" r:id="rId10"/>
     <p:sldId id="268" r:id="rId11"/>
-    <p:sldId id="269" r:id="rId12"/>
-    <p:sldId id="270" r:id="rId13"/>
-    <p:sldId id="271" r:id="rId14"/>
-    <p:sldId id="272" r:id="rId15"/>
+    <p:sldId id="271" r:id="rId12"/>
+    <p:sldId id="272" r:id="rId13"/>
+    <p:sldId id="273" r:id="rId14"/>
+    <p:sldId id="274" r:id="rId15"/>
+    <p:sldId id="275" r:id="rId16"/>
+    <p:sldId id="276" r:id="rId17"/>
   </p:sldIdLst>
   <p:sldSz cx="12192000" cy="6858000"/>
   <p:notesSz cx="6858000" cy="9144000"/>
@@ -274,7 +276,7 @@
           <a:p>
             <a:fld id="{860C609C-6F01-41DE-9C81-127E5EFAB8EE}" type="datetimeFigureOut">
               <a:rPr lang="en-CA" smtClean="0"/>
-              <a:t>2022-04-26</a:t>
+              <a:t>2022-05-15</a:t>
             </a:fld>
             <a:endParaRPr lang="en-CA"/>
           </a:p>
@@ -474,7 +476,7 @@
           <a:p>
             <a:fld id="{860C609C-6F01-41DE-9C81-127E5EFAB8EE}" type="datetimeFigureOut">
               <a:rPr lang="en-CA" smtClean="0"/>
-              <a:t>2022-04-26</a:t>
+              <a:t>2022-05-15</a:t>
             </a:fld>
             <a:endParaRPr lang="en-CA"/>
           </a:p>
@@ -684,7 +686,7 @@
           <a:p>
             <a:fld id="{860C609C-6F01-41DE-9C81-127E5EFAB8EE}" type="datetimeFigureOut">
               <a:rPr lang="en-CA" smtClean="0"/>
-              <a:t>2022-04-26</a:t>
+              <a:t>2022-05-15</a:t>
             </a:fld>
             <a:endParaRPr lang="en-CA"/>
           </a:p>
@@ -884,7 +886,7 @@
           <a:p>
             <a:fld id="{860C609C-6F01-41DE-9C81-127E5EFAB8EE}" type="datetimeFigureOut">
               <a:rPr lang="en-CA" smtClean="0"/>
-              <a:t>2022-04-26</a:t>
+              <a:t>2022-05-15</a:t>
             </a:fld>
             <a:endParaRPr lang="en-CA"/>
           </a:p>
@@ -1160,7 +1162,7 @@
           <a:p>
             <a:fld id="{860C609C-6F01-41DE-9C81-127E5EFAB8EE}" type="datetimeFigureOut">
               <a:rPr lang="en-CA" smtClean="0"/>
-              <a:t>2022-04-26</a:t>
+              <a:t>2022-05-15</a:t>
             </a:fld>
             <a:endParaRPr lang="en-CA"/>
           </a:p>
@@ -1428,7 +1430,7 @@
           <a:p>
             <a:fld id="{860C609C-6F01-41DE-9C81-127E5EFAB8EE}" type="datetimeFigureOut">
               <a:rPr lang="en-CA" smtClean="0"/>
-              <a:t>2022-04-26</a:t>
+              <a:t>2022-05-15</a:t>
             </a:fld>
             <a:endParaRPr lang="en-CA"/>
           </a:p>
@@ -1843,7 +1845,7 @@
           <a:p>
             <a:fld id="{860C609C-6F01-41DE-9C81-127E5EFAB8EE}" type="datetimeFigureOut">
               <a:rPr lang="en-CA" smtClean="0"/>
-              <a:t>2022-04-26</a:t>
+              <a:t>2022-05-15</a:t>
             </a:fld>
             <a:endParaRPr lang="en-CA"/>
           </a:p>
@@ -1985,7 +1987,7 @@
           <a:p>
             <a:fld id="{860C609C-6F01-41DE-9C81-127E5EFAB8EE}" type="datetimeFigureOut">
               <a:rPr lang="en-CA" smtClean="0"/>
-              <a:t>2022-04-26</a:t>
+              <a:t>2022-05-15</a:t>
             </a:fld>
             <a:endParaRPr lang="en-CA"/>
           </a:p>
@@ -2098,7 +2100,7 @@
           <a:p>
             <a:fld id="{860C609C-6F01-41DE-9C81-127E5EFAB8EE}" type="datetimeFigureOut">
               <a:rPr lang="en-CA" smtClean="0"/>
-              <a:t>2022-04-26</a:t>
+              <a:t>2022-05-15</a:t>
             </a:fld>
             <a:endParaRPr lang="en-CA"/>
           </a:p>
@@ -2411,7 +2413,7 @@
           <a:p>
             <a:fld id="{860C609C-6F01-41DE-9C81-127E5EFAB8EE}" type="datetimeFigureOut">
               <a:rPr lang="en-CA" smtClean="0"/>
-              <a:t>2022-04-26</a:t>
+              <a:t>2022-05-15</a:t>
             </a:fld>
             <a:endParaRPr lang="en-CA"/>
           </a:p>
@@ -2700,7 +2702,7 @@
           <a:p>
             <a:fld id="{860C609C-6F01-41DE-9C81-127E5EFAB8EE}" type="datetimeFigureOut">
               <a:rPr lang="en-CA" smtClean="0"/>
-              <a:t>2022-04-26</a:t>
+              <a:t>2022-05-15</a:t>
             </a:fld>
             <a:endParaRPr lang="en-CA"/>
           </a:p>
@@ -2943,7 +2945,7 @@
           <a:p>
             <a:fld id="{860C609C-6F01-41DE-9C81-127E5EFAB8EE}" type="datetimeFigureOut">
               <a:rPr lang="en-CA" smtClean="0"/>
-              <a:t>2022-04-26</a:t>
+              <a:t>2022-05-15</a:t>
             </a:fld>
             <a:endParaRPr lang="en-CA"/>
           </a:p>
@@ -3698,12 +3700,54 @@
           <a:chExt cx="0" cy="0"/>
         </a:xfrm>
       </p:grpSpPr>
+      <p:sp>
+        <p:nvSpPr>
+          <p:cNvPr id="2" name="TextBox 1">
+            <a:extLst>
+              <a:ext uri="{FF2B5EF4-FFF2-40B4-BE49-F238E27FC236}">
+                <a16:creationId xmlns:a16="http://schemas.microsoft.com/office/drawing/2014/main" id="{3F85D553-D8C2-48EC-A2F9-303B64EEA259}"/>
+              </a:ext>
+            </a:extLst>
+          </p:cNvPr>
+          <p:cNvSpPr txBox="1"/>
+          <p:nvPr/>
+        </p:nvSpPr>
+        <p:spPr>
+          <a:xfrm>
+            <a:off x="115138" y="301021"/>
+            <a:ext cx="5819955" cy="830997"/>
+          </a:xfrm>
+          <a:prstGeom prst="rect">
+            <a:avLst/>
+          </a:prstGeom>
+          <a:noFill/>
+        </p:spPr>
+        <p:txBody>
+          <a:bodyPr wrap="square" rtlCol="0">
+            <a:spAutoFit/>
+          </a:bodyPr>
+          <a:lstStyle/>
+          <a:p>
+            <a:r>
+              <a:rPr lang="en-CA" sz="2400" dirty="0"/>
+              <a:t>Colony 59 (No-Choice) </a:t>
+            </a:r>
+            <a:br>
+              <a:rPr lang="en-CA" sz="2400" dirty="0"/>
+            </a:br>
+            <a:r>
+              <a:rPr lang="en-CA" sz="2400" dirty="0"/>
+              <a:t>Node size and edge width = out-strength</a:t>
+            </a:r>
+          </a:p>
+        </p:txBody>
+      </p:sp>
       <p:pic>
         <p:nvPicPr>
-          <p:cNvPr id="3" name="Picture 2">
-            <a:extLst>
-              <a:ext uri="{FF2B5EF4-FFF2-40B4-BE49-F238E27FC236}">
-                <a16:creationId xmlns:a16="http://schemas.microsoft.com/office/drawing/2014/main" id="{1F354116-1DBF-4819-8FB9-8062BADDF855}"/>
+          <p:cNvPr id="4" name="Picture 3">
+            <a:extLst>
+              <a:ext uri="{FF2B5EF4-FFF2-40B4-BE49-F238E27FC236}">
+                <a16:creationId xmlns:a16="http://schemas.microsoft.com/office/drawing/2014/main" id="{8855A9EA-DAE4-4DD5-8165-6F800722BFA2}"/>
               </a:ext>
             </a:extLst>
           </p:cNvPr>
@@ -3720,8 +3764,8 @@
         </p:blipFill>
         <p:spPr>
           <a:xfrm>
-            <a:off x="184628" y="1511539"/>
-            <a:ext cx="3892753" cy="3849210"/>
+            <a:off x="115138" y="1767491"/>
+            <a:ext cx="3732243" cy="3740687"/>
           </a:xfrm>
           <a:prstGeom prst="rect">
             <a:avLst/>
@@ -3730,10 +3774,10 @@
       </p:pic>
       <p:pic>
         <p:nvPicPr>
-          <p:cNvPr id="5" name="Picture 4">
-            <a:extLst>
-              <a:ext uri="{FF2B5EF4-FFF2-40B4-BE49-F238E27FC236}">
-                <a16:creationId xmlns:a16="http://schemas.microsoft.com/office/drawing/2014/main" id="{ADD2B246-F7E4-4484-A965-B6F67503F4BE}"/>
+          <p:cNvPr id="6" name="Picture 5">
+            <a:extLst>
+              <a:ext uri="{FF2B5EF4-FFF2-40B4-BE49-F238E27FC236}">
+                <a16:creationId xmlns:a16="http://schemas.microsoft.com/office/drawing/2014/main" id="{EDDD6532-839B-4212-8F42-A969A2611586}"/>
               </a:ext>
             </a:extLst>
           </p:cNvPr>
@@ -3750,8 +3794,8 @@
         </p:blipFill>
         <p:spPr>
           <a:xfrm>
-            <a:off x="4172932" y="1497250"/>
-            <a:ext cx="3846136" cy="3863500"/>
+            <a:off x="3937587" y="1757965"/>
+            <a:ext cx="3753826" cy="3745353"/>
           </a:xfrm>
           <a:prstGeom prst="rect">
             <a:avLst/>
@@ -3760,10 +3804,10 @@
       </p:pic>
       <p:pic>
         <p:nvPicPr>
-          <p:cNvPr id="7" name="Picture 6">
-            <a:extLst>
-              <a:ext uri="{FF2B5EF4-FFF2-40B4-BE49-F238E27FC236}">
-                <a16:creationId xmlns:a16="http://schemas.microsoft.com/office/drawing/2014/main" id="{85DA29F0-518D-40B6-BCA7-503963EB6E09}"/>
+          <p:cNvPr id="8" name="Picture 7">
+            <a:extLst>
+              <a:ext uri="{FF2B5EF4-FFF2-40B4-BE49-F238E27FC236}">
+                <a16:creationId xmlns:a16="http://schemas.microsoft.com/office/drawing/2014/main" id="{05317A3B-4968-4497-8664-62D6567FFE10}"/>
               </a:ext>
             </a:extLst>
           </p:cNvPr>
@@ -3780,60 +3824,18 @@
         </p:blipFill>
         <p:spPr>
           <a:xfrm>
-            <a:off x="8114618" y="1497249"/>
-            <a:ext cx="3828534" cy="3863499"/>
+            <a:off x="7866224" y="1757965"/>
+            <a:ext cx="3753846" cy="3745353"/>
           </a:xfrm>
           <a:prstGeom prst="rect">
             <a:avLst/>
           </a:prstGeom>
         </p:spPr>
       </p:pic>
-      <p:sp>
-        <p:nvSpPr>
-          <p:cNvPr id="8" name="TextBox 7">
-            <a:extLst>
-              <a:ext uri="{FF2B5EF4-FFF2-40B4-BE49-F238E27FC236}">
-                <a16:creationId xmlns:a16="http://schemas.microsoft.com/office/drawing/2014/main" id="{23C148A7-85D4-4F3B-A551-8B8E56DE9BE3}"/>
-              </a:ext>
-            </a:extLst>
-          </p:cNvPr>
-          <p:cNvSpPr txBox="1"/>
-          <p:nvPr/>
-        </p:nvSpPr>
-        <p:spPr>
-          <a:xfrm>
-            <a:off x="115138" y="301021"/>
-            <a:ext cx="5819955" cy="830997"/>
-          </a:xfrm>
-          <a:prstGeom prst="rect">
-            <a:avLst/>
-          </a:prstGeom>
-          <a:noFill/>
-        </p:spPr>
-        <p:txBody>
-          <a:bodyPr wrap="square" rtlCol="0">
-            <a:spAutoFit/>
-          </a:bodyPr>
-          <a:lstStyle/>
-          <a:p>
-            <a:r>
-              <a:rPr lang="en-CA" sz="2400" dirty="0"/>
-              <a:t>Colony 59 (No-Choice) </a:t>
-            </a:r>
-            <a:br>
-              <a:rPr lang="en-CA" sz="2400" dirty="0"/>
-            </a:br>
-            <a:r>
-              <a:rPr lang="en-CA" sz="2400" dirty="0"/>
-              <a:t>Node size and edge width = out-strength</a:t>
-            </a:r>
-          </a:p>
-        </p:txBody>
-      </p:sp>
     </p:spTree>
     <p:extLst>
       <p:ext uri="{BB962C8B-B14F-4D97-AF65-F5344CB8AC3E}">
-        <p14:creationId xmlns:p14="http://schemas.microsoft.com/office/powerpoint/2010/main" val="4038578512"/>
+        <p14:creationId xmlns:p14="http://schemas.microsoft.com/office/powerpoint/2010/main" val="1818028940"/>
       </p:ext>
     </p:extLst>
   </p:cSld>
@@ -3860,47 +3862,12 @@
           <a:chExt cx="0" cy="0"/>
         </a:xfrm>
       </p:grpSpPr>
-      <p:sp>
-        <p:nvSpPr>
-          <p:cNvPr id="2" name="TextBox 1">
-            <a:extLst>
-              <a:ext uri="{FF2B5EF4-FFF2-40B4-BE49-F238E27FC236}">
-                <a16:creationId xmlns:a16="http://schemas.microsoft.com/office/drawing/2014/main" id="{E066F354-086E-4D8E-A8AA-A39A2EC99519}"/>
-              </a:ext>
-            </a:extLst>
-          </p:cNvPr>
-          <p:cNvSpPr txBox="1"/>
-          <p:nvPr/>
-        </p:nvSpPr>
-        <p:spPr>
-          <a:xfrm>
-            <a:off x="276045" y="396815"/>
-            <a:ext cx="7317829" cy="461665"/>
-          </a:xfrm>
-          <a:prstGeom prst="rect">
-            <a:avLst/>
-          </a:prstGeom>
-          <a:noFill/>
-        </p:spPr>
-        <p:txBody>
-          <a:bodyPr wrap="square" rtlCol="0">
-            <a:spAutoFit/>
-          </a:bodyPr>
-          <a:lstStyle/>
-          <a:p>
-            <a:r>
-              <a:rPr lang="en-CA" sz="2400" dirty="0"/>
-              <a:t>Colony 59 (No Choice) Out-strength distributions</a:t>
-            </a:r>
-          </a:p>
-        </p:txBody>
-      </p:sp>
       <p:pic>
         <p:nvPicPr>
-          <p:cNvPr id="4" name="Picture 3">
-            <a:extLst>
-              <a:ext uri="{FF2B5EF4-FFF2-40B4-BE49-F238E27FC236}">
-                <a16:creationId xmlns:a16="http://schemas.microsoft.com/office/drawing/2014/main" id="{C0460D53-C3B7-45AA-B1E5-0D02E96F803B}"/>
+          <p:cNvPr id="3" name="Picture 2">
+            <a:extLst>
+              <a:ext uri="{FF2B5EF4-FFF2-40B4-BE49-F238E27FC236}">
+                <a16:creationId xmlns:a16="http://schemas.microsoft.com/office/drawing/2014/main" id="{1440CF21-8133-4CE9-B27F-5616CCDAAE97}"/>
               </a:ext>
             </a:extLst>
           </p:cNvPr>
@@ -3917,8 +3884,8 @@
         </p:blipFill>
         <p:spPr>
           <a:xfrm>
-            <a:off x="131047" y="1563575"/>
-            <a:ext cx="4067743" cy="4324954"/>
+            <a:off x="89869" y="1626770"/>
+            <a:ext cx="4096322" cy="4277322"/>
           </a:xfrm>
           <a:prstGeom prst="rect">
             <a:avLst/>
@@ -3927,10 +3894,10 @@
       </p:pic>
       <p:pic>
         <p:nvPicPr>
-          <p:cNvPr id="6" name="Picture 5">
-            <a:extLst>
-              <a:ext uri="{FF2B5EF4-FFF2-40B4-BE49-F238E27FC236}">
-                <a16:creationId xmlns:a16="http://schemas.microsoft.com/office/drawing/2014/main" id="{666083B8-8C99-4ED6-A5C9-8E936C7F9771}"/>
+          <p:cNvPr id="5" name="Picture 4">
+            <a:extLst>
+              <a:ext uri="{FF2B5EF4-FFF2-40B4-BE49-F238E27FC236}">
+                <a16:creationId xmlns:a16="http://schemas.microsoft.com/office/drawing/2014/main" id="{801ACA9E-2B66-426A-8953-6A3E2CE1286C}"/>
               </a:ext>
             </a:extLst>
           </p:cNvPr>
@@ -3947,8 +3914,8 @@
         </p:blipFill>
         <p:spPr>
           <a:xfrm>
-            <a:off x="4198790" y="1549285"/>
-            <a:ext cx="3858163" cy="4353533"/>
+            <a:off x="4204806" y="1583901"/>
+            <a:ext cx="3801005" cy="4363059"/>
           </a:xfrm>
           <a:prstGeom prst="rect">
             <a:avLst/>
@@ -3957,10 +3924,10 @@
       </p:pic>
       <p:pic>
         <p:nvPicPr>
-          <p:cNvPr id="8" name="Picture 7">
-            <a:extLst>
-              <a:ext uri="{FF2B5EF4-FFF2-40B4-BE49-F238E27FC236}">
-                <a16:creationId xmlns:a16="http://schemas.microsoft.com/office/drawing/2014/main" id="{F6F01E73-4320-4D6E-BE85-D6BC03088D44}"/>
+          <p:cNvPr id="7" name="Picture 6">
+            <a:extLst>
+              <a:ext uri="{FF2B5EF4-FFF2-40B4-BE49-F238E27FC236}">
+                <a16:creationId xmlns:a16="http://schemas.microsoft.com/office/drawing/2014/main" id="{7028DE9E-B3CC-499A-B62D-40C77C65E1F6}"/>
               </a:ext>
             </a:extLst>
           </p:cNvPr>
@@ -3977,18 +3944,53 @@
         </p:blipFill>
         <p:spPr>
           <a:xfrm>
-            <a:off x="8130137" y="1687418"/>
-            <a:ext cx="3791479" cy="4201111"/>
+            <a:off x="8024426" y="1679164"/>
+            <a:ext cx="3829584" cy="4267796"/>
           </a:xfrm>
           <a:prstGeom prst="rect">
             <a:avLst/>
           </a:prstGeom>
         </p:spPr>
       </p:pic>
+      <p:sp>
+        <p:nvSpPr>
+          <p:cNvPr id="8" name="TextBox 7">
+            <a:extLst>
+              <a:ext uri="{FF2B5EF4-FFF2-40B4-BE49-F238E27FC236}">
+                <a16:creationId xmlns:a16="http://schemas.microsoft.com/office/drawing/2014/main" id="{CE74092B-7992-41BE-BFB0-985E508ABD3A}"/>
+              </a:ext>
+            </a:extLst>
+          </p:cNvPr>
+          <p:cNvSpPr txBox="1"/>
+          <p:nvPr/>
+        </p:nvSpPr>
+        <p:spPr>
+          <a:xfrm>
+            <a:off x="276045" y="396815"/>
+            <a:ext cx="7317829" cy="461665"/>
+          </a:xfrm>
+          <a:prstGeom prst="rect">
+            <a:avLst/>
+          </a:prstGeom>
+          <a:noFill/>
+        </p:spPr>
+        <p:txBody>
+          <a:bodyPr wrap="square" rtlCol="0">
+            <a:spAutoFit/>
+          </a:bodyPr>
+          <a:lstStyle/>
+          <a:p>
+            <a:r>
+              <a:rPr lang="en-CA" sz="2400" dirty="0"/>
+              <a:t>Colony 59 (No Choice) Out-strength distributions</a:t>
+            </a:r>
+          </a:p>
+        </p:txBody>
+      </p:sp>
     </p:spTree>
     <p:extLst>
       <p:ext uri="{BB962C8B-B14F-4D97-AF65-F5344CB8AC3E}">
-        <p14:creationId xmlns:p14="http://schemas.microsoft.com/office/powerpoint/2010/main" val="1942770822"/>
+        <p14:creationId xmlns:p14="http://schemas.microsoft.com/office/powerpoint/2010/main" val="270700745"/>
       </p:ext>
     </p:extLst>
   </p:cSld>
@@ -4015,54 +4017,12 @@
           <a:chExt cx="0" cy="0"/>
         </a:xfrm>
       </p:grpSpPr>
-      <p:sp>
-        <p:nvSpPr>
-          <p:cNvPr id="2" name="TextBox 1">
-            <a:extLst>
-              <a:ext uri="{FF2B5EF4-FFF2-40B4-BE49-F238E27FC236}">
-                <a16:creationId xmlns:a16="http://schemas.microsoft.com/office/drawing/2014/main" id="{3F85D553-D8C2-48EC-A2F9-303B64EEA259}"/>
-              </a:ext>
-            </a:extLst>
-          </p:cNvPr>
-          <p:cNvSpPr txBox="1"/>
-          <p:nvPr/>
-        </p:nvSpPr>
-        <p:spPr>
-          <a:xfrm>
-            <a:off x="115138" y="301021"/>
-            <a:ext cx="5819955" cy="830997"/>
-          </a:xfrm>
-          <a:prstGeom prst="rect">
-            <a:avLst/>
-          </a:prstGeom>
-          <a:noFill/>
-        </p:spPr>
-        <p:txBody>
-          <a:bodyPr wrap="square" rtlCol="0">
-            <a:spAutoFit/>
-          </a:bodyPr>
-          <a:lstStyle/>
-          <a:p>
-            <a:r>
-              <a:rPr lang="en-CA" sz="2400" dirty="0"/>
-              <a:t>Colony 59 (No-Choice) </a:t>
-            </a:r>
-            <a:br>
-              <a:rPr lang="en-CA" sz="2400" dirty="0"/>
-            </a:br>
-            <a:r>
-              <a:rPr lang="en-CA" sz="2400" dirty="0"/>
-              <a:t>Node size and edge width = out-strength</a:t>
-            </a:r>
-          </a:p>
-        </p:txBody>
-      </p:sp>
       <p:pic>
         <p:nvPicPr>
-          <p:cNvPr id="4" name="Picture 3">
-            <a:extLst>
-              <a:ext uri="{FF2B5EF4-FFF2-40B4-BE49-F238E27FC236}">
-                <a16:creationId xmlns:a16="http://schemas.microsoft.com/office/drawing/2014/main" id="{8855A9EA-DAE4-4DD5-8165-6F800722BFA2}"/>
+          <p:cNvPr id="3" name="Picture 2">
+            <a:extLst>
+              <a:ext uri="{FF2B5EF4-FFF2-40B4-BE49-F238E27FC236}">
+                <a16:creationId xmlns:a16="http://schemas.microsoft.com/office/drawing/2014/main" id="{A186DC00-3AD8-B050-AD43-00D3AECD6DFD}"/>
               </a:ext>
             </a:extLst>
           </p:cNvPr>
@@ -4079,8 +4039,8 @@
         </p:blipFill>
         <p:spPr>
           <a:xfrm>
-            <a:off x="115138" y="1767491"/>
-            <a:ext cx="3732243" cy="3740687"/>
+            <a:off x="460436" y="1592213"/>
+            <a:ext cx="3690307" cy="3690307"/>
           </a:xfrm>
           <a:prstGeom prst="rect">
             <a:avLst/>
@@ -4089,10 +4049,10 @@
       </p:pic>
       <p:pic>
         <p:nvPicPr>
-          <p:cNvPr id="6" name="Picture 5">
-            <a:extLst>
-              <a:ext uri="{FF2B5EF4-FFF2-40B4-BE49-F238E27FC236}">
-                <a16:creationId xmlns:a16="http://schemas.microsoft.com/office/drawing/2014/main" id="{EDDD6532-839B-4212-8F42-A969A2611586}"/>
+          <p:cNvPr id="5" name="Picture 4">
+            <a:extLst>
+              <a:ext uri="{FF2B5EF4-FFF2-40B4-BE49-F238E27FC236}">
+                <a16:creationId xmlns:a16="http://schemas.microsoft.com/office/drawing/2014/main" id="{567E9BD1-7184-18FA-31AB-72249B8D2AA6}"/>
               </a:ext>
             </a:extLst>
           </p:cNvPr>
@@ -4109,8 +4069,8 @@
         </p:blipFill>
         <p:spPr>
           <a:xfrm>
-            <a:off x="3937587" y="1757965"/>
-            <a:ext cx="3753826" cy="3745353"/>
+            <a:off x="4310909" y="1592213"/>
+            <a:ext cx="3690307" cy="3657211"/>
           </a:xfrm>
           <a:prstGeom prst="rect">
             <a:avLst/>
@@ -4119,10 +4079,10 @@
       </p:pic>
       <p:pic>
         <p:nvPicPr>
-          <p:cNvPr id="8" name="Picture 7">
-            <a:extLst>
-              <a:ext uri="{FF2B5EF4-FFF2-40B4-BE49-F238E27FC236}">
-                <a16:creationId xmlns:a16="http://schemas.microsoft.com/office/drawing/2014/main" id="{05317A3B-4968-4497-8664-62D6567FFE10}"/>
+          <p:cNvPr id="7" name="Picture 6">
+            <a:extLst>
+              <a:ext uri="{FF2B5EF4-FFF2-40B4-BE49-F238E27FC236}">
+                <a16:creationId xmlns:a16="http://schemas.microsoft.com/office/drawing/2014/main" id="{22CF92A5-0498-9629-4963-81B24B786145}"/>
               </a:ext>
             </a:extLst>
           </p:cNvPr>
@@ -4139,18 +4099,60 @@
         </p:blipFill>
         <p:spPr>
           <a:xfrm>
-            <a:off x="7866224" y="1757965"/>
-            <a:ext cx="3753846" cy="3745353"/>
+            <a:off x="8096901" y="1592214"/>
+            <a:ext cx="3690307" cy="3673572"/>
           </a:xfrm>
           <a:prstGeom prst="rect">
             <a:avLst/>
           </a:prstGeom>
         </p:spPr>
       </p:pic>
+      <p:sp>
+        <p:nvSpPr>
+          <p:cNvPr id="8" name="TextBox 7">
+            <a:extLst>
+              <a:ext uri="{FF2B5EF4-FFF2-40B4-BE49-F238E27FC236}">
+                <a16:creationId xmlns:a16="http://schemas.microsoft.com/office/drawing/2014/main" id="{F4675F2C-10A0-8681-AE19-67AC8F443F2F}"/>
+              </a:ext>
+            </a:extLst>
+          </p:cNvPr>
+          <p:cNvSpPr txBox="1"/>
+          <p:nvPr/>
+        </p:nvSpPr>
+        <p:spPr>
+          <a:xfrm>
+            <a:off x="115138" y="301021"/>
+            <a:ext cx="5819955" cy="830997"/>
+          </a:xfrm>
+          <a:prstGeom prst="rect">
+            <a:avLst/>
+          </a:prstGeom>
+          <a:noFill/>
+        </p:spPr>
+        <p:txBody>
+          <a:bodyPr wrap="square" rtlCol="0">
+            <a:spAutoFit/>
+          </a:bodyPr>
+          <a:lstStyle/>
+          <a:p>
+            <a:r>
+              <a:rPr lang="en-CA" sz="2400" dirty="0"/>
+              <a:t>Colony 45 (No-Choice) </a:t>
+            </a:r>
+            <a:br>
+              <a:rPr lang="en-CA" sz="2400" dirty="0"/>
+            </a:br>
+            <a:r>
+              <a:rPr lang="en-CA" sz="2400" dirty="0"/>
+              <a:t>Node size and edge width = out-strength</a:t>
+            </a:r>
+          </a:p>
+        </p:txBody>
+      </p:sp>
     </p:spTree>
     <p:extLst>
       <p:ext uri="{BB962C8B-B14F-4D97-AF65-F5344CB8AC3E}">
-        <p14:creationId xmlns:p14="http://schemas.microsoft.com/office/powerpoint/2010/main" val="1818028940"/>
+        <p14:creationId xmlns:p14="http://schemas.microsoft.com/office/powerpoint/2010/main" val="873420916"/>
       </p:ext>
     </p:extLst>
   </p:cSld>
@@ -4182,7 +4184,7 @@
           <p:cNvPr id="3" name="Picture 2">
             <a:extLst>
               <a:ext uri="{FF2B5EF4-FFF2-40B4-BE49-F238E27FC236}">
-                <a16:creationId xmlns:a16="http://schemas.microsoft.com/office/drawing/2014/main" id="{1440CF21-8133-4CE9-B27F-5616CCDAAE97}"/>
+                <a16:creationId xmlns:a16="http://schemas.microsoft.com/office/drawing/2014/main" id="{FC469D9B-CB31-B5A7-E809-73397F505B66}"/>
               </a:ext>
             </a:extLst>
           </p:cNvPr>
@@ -4199,20 +4201,55 @@
         </p:blipFill>
         <p:spPr>
           <a:xfrm>
-            <a:off x="89869" y="1626770"/>
-            <a:ext cx="4096322" cy="4277322"/>
+            <a:off x="339753" y="1641696"/>
+            <a:ext cx="3886742" cy="4143953"/>
           </a:xfrm>
           <a:prstGeom prst="rect">
             <a:avLst/>
           </a:prstGeom>
         </p:spPr>
       </p:pic>
+      <p:sp>
+        <p:nvSpPr>
+          <p:cNvPr id="4" name="TextBox 3">
+            <a:extLst>
+              <a:ext uri="{FF2B5EF4-FFF2-40B4-BE49-F238E27FC236}">
+                <a16:creationId xmlns:a16="http://schemas.microsoft.com/office/drawing/2014/main" id="{E801D2D0-AED4-04E7-3FAD-801913734852}"/>
+              </a:ext>
+            </a:extLst>
+          </p:cNvPr>
+          <p:cNvSpPr txBox="1"/>
+          <p:nvPr/>
+        </p:nvSpPr>
+        <p:spPr>
+          <a:xfrm>
+            <a:off x="276045" y="396815"/>
+            <a:ext cx="7317829" cy="461665"/>
+          </a:xfrm>
+          <a:prstGeom prst="rect">
+            <a:avLst/>
+          </a:prstGeom>
+          <a:noFill/>
+        </p:spPr>
+        <p:txBody>
+          <a:bodyPr wrap="square" rtlCol="0">
+            <a:spAutoFit/>
+          </a:bodyPr>
+          <a:lstStyle/>
+          <a:p>
+            <a:r>
+              <a:rPr lang="en-CA" sz="2400" dirty="0"/>
+              <a:t>Colony 45 (No Choice) Out-strength distributions</a:t>
+            </a:r>
+          </a:p>
+        </p:txBody>
+      </p:sp>
       <p:pic>
         <p:nvPicPr>
-          <p:cNvPr id="5" name="Picture 4">
-            <a:extLst>
-              <a:ext uri="{FF2B5EF4-FFF2-40B4-BE49-F238E27FC236}">
-                <a16:creationId xmlns:a16="http://schemas.microsoft.com/office/drawing/2014/main" id="{801ACA9E-2B66-426A-8953-6A3E2CE1286C}"/>
+          <p:cNvPr id="6" name="Picture 5">
+            <a:extLst>
+              <a:ext uri="{FF2B5EF4-FFF2-40B4-BE49-F238E27FC236}">
+                <a16:creationId xmlns:a16="http://schemas.microsoft.com/office/drawing/2014/main" id="{D4E953AA-6CC5-50B8-30F9-E7CB71D68081}"/>
               </a:ext>
             </a:extLst>
           </p:cNvPr>
@@ -4229,8 +4266,8 @@
         </p:blipFill>
         <p:spPr>
           <a:xfrm>
-            <a:off x="4204806" y="1583901"/>
-            <a:ext cx="3801005" cy="4363059"/>
+            <a:off x="4276538" y="1434289"/>
+            <a:ext cx="3429479" cy="4334480"/>
           </a:xfrm>
           <a:prstGeom prst="rect">
             <a:avLst/>
@@ -4239,10 +4276,10 @@
       </p:pic>
       <p:pic>
         <p:nvPicPr>
-          <p:cNvPr id="7" name="Picture 6">
-            <a:extLst>
-              <a:ext uri="{FF2B5EF4-FFF2-40B4-BE49-F238E27FC236}">
-                <a16:creationId xmlns:a16="http://schemas.microsoft.com/office/drawing/2014/main" id="{7028DE9E-B3CC-499A-B62D-40C77C65E1F6}"/>
+          <p:cNvPr id="8" name="Picture 7">
+            <a:extLst>
+              <a:ext uri="{FF2B5EF4-FFF2-40B4-BE49-F238E27FC236}">
+                <a16:creationId xmlns:a16="http://schemas.microsoft.com/office/drawing/2014/main" id="{89DFDEE6-6065-B9FA-C0EF-F8239074A74B}"/>
               </a:ext>
             </a:extLst>
           </p:cNvPr>
@@ -4259,20 +4296,110 @@
         </p:blipFill>
         <p:spPr>
           <a:xfrm>
-            <a:off x="8024426" y="1679164"/>
-            <a:ext cx="3829584" cy="4267796"/>
+            <a:off x="7984293" y="1548605"/>
+            <a:ext cx="3762900" cy="4220164"/>
           </a:xfrm>
           <a:prstGeom prst="rect">
             <a:avLst/>
           </a:prstGeom>
         </p:spPr>
       </p:pic>
-      <p:sp>
-        <p:nvSpPr>
-          <p:cNvPr id="8" name="TextBox 7">
-            <a:extLst>
-              <a:ext uri="{FF2B5EF4-FFF2-40B4-BE49-F238E27FC236}">
-                <a16:creationId xmlns:a16="http://schemas.microsoft.com/office/drawing/2014/main" id="{CE74092B-7992-41BE-BFB0-985E508ABD3A}"/>
+    </p:spTree>
+    <p:extLst>
+      <p:ext uri="{BB962C8B-B14F-4D97-AF65-F5344CB8AC3E}">
+        <p14:creationId xmlns:p14="http://schemas.microsoft.com/office/powerpoint/2010/main" val="3535751779"/>
+      </p:ext>
+    </p:extLst>
+  </p:cSld>
+  <p:clrMapOvr>
+    <a:masterClrMapping/>
+  </p:clrMapOvr>
+</p:sld>
+</file>
+
+<file path=ppt/slides/slide15.xml><?xml version="1.0" encoding="utf-8"?>
+<p:sld xmlns:a="http://schemas.openxmlformats.org/drawingml/2006/main" xmlns:r="http://schemas.openxmlformats.org/officeDocument/2006/relationships" xmlns:p="http://schemas.openxmlformats.org/presentationml/2006/main">
+  <p:cSld>
+    <p:spTree>
+      <p:nvGrpSpPr>
+        <p:cNvPr id="1" name=""/>
+        <p:cNvGrpSpPr/>
+        <p:nvPr/>
+      </p:nvGrpSpPr>
+      <p:grpSpPr>
+        <a:xfrm>
+          <a:off x="0" y="0"/>
+          <a:ext cx="0" cy="0"/>
+          <a:chOff x="0" y="0"/>
+          <a:chExt cx="0" cy="0"/>
+        </a:xfrm>
+      </p:grpSpPr>
+      <p:pic>
+        <p:nvPicPr>
+          <p:cNvPr id="3" name="Picture 2">
+            <a:extLst>
+              <a:ext uri="{FF2B5EF4-FFF2-40B4-BE49-F238E27FC236}">
+                <a16:creationId xmlns:a16="http://schemas.microsoft.com/office/drawing/2014/main" id="{7C642770-CAC4-1590-36EB-4A98458D7BFA}"/>
+              </a:ext>
+            </a:extLst>
+          </p:cNvPr>
+          <p:cNvPicPr>
+            <a:picLocks noChangeAspect="1"/>
+          </p:cNvPicPr>
+          <p:nvPr/>
+        </p:nvPicPr>
+        <p:blipFill>
+          <a:blip r:embed="rId2"/>
+          <a:stretch>
+            <a:fillRect/>
+          </a:stretch>
+        </p:blipFill>
+        <p:spPr>
+          <a:xfrm>
+            <a:off x="3897854" y="1673524"/>
+            <a:ext cx="3926574" cy="3891437"/>
+          </a:xfrm>
+          <a:prstGeom prst="rect">
+            <a:avLst/>
+          </a:prstGeom>
+        </p:spPr>
+      </p:pic>
+      <p:pic>
+        <p:nvPicPr>
+          <p:cNvPr id="5" name="Picture 4">
+            <a:extLst>
+              <a:ext uri="{FF2B5EF4-FFF2-40B4-BE49-F238E27FC236}">
+                <a16:creationId xmlns:a16="http://schemas.microsoft.com/office/drawing/2014/main" id="{F8D7FCB3-3F7D-112D-3AB2-B91A82B37B24}"/>
+              </a:ext>
+            </a:extLst>
+          </p:cNvPr>
+          <p:cNvPicPr>
+            <a:picLocks noChangeAspect="1"/>
+          </p:cNvPicPr>
+          <p:nvPr/>
+        </p:nvPicPr>
+        <p:blipFill>
+          <a:blip r:embed="rId3"/>
+          <a:stretch>
+            <a:fillRect/>
+          </a:stretch>
+        </p:blipFill>
+        <p:spPr>
+          <a:xfrm>
+            <a:off x="8022836" y="1673524"/>
+            <a:ext cx="3926574" cy="3891437"/>
+          </a:xfrm>
+          <a:prstGeom prst="rect">
+            <a:avLst/>
+          </a:prstGeom>
+        </p:spPr>
+      </p:pic>
+      <p:sp>
+        <p:nvSpPr>
+          <p:cNvPr id="6" name="TextBox 5">
+            <a:extLst>
+              <a:ext uri="{FF2B5EF4-FFF2-40B4-BE49-F238E27FC236}">
+                <a16:creationId xmlns:a16="http://schemas.microsoft.com/office/drawing/2014/main" id="{ADF34DA6-E682-AFFD-CB70-1A04E58BA44B}"/>
               </a:ext>
             </a:extLst>
           </p:cNvPr>
@@ -4281,8 +4408,8 @@
         </p:nvSpPr>
         <p:spPr>
           <a:xfrm>
-            <a:off x="276045" y="396815"/>
-            <a:ext cx="7317829" cy="461665"/>
+            <a:off x="115138" y="301021"/>
+            <a:ext cx="9865624" cy="1200329"/>
           </a:xfrm>
           <a:prstGeom prst="rect">
             <a:avLst/>
@@ -4297,7 +4424,25 @@
           <a:p>
             <a:r>
               <a:rPr lang="en-CA" sz="2400" dirty="0"/>
-              <a:t>Colony 59 (No Choice) Out-strength distributions</a:t>
+              <a:t>Colony 47 (No-Choice) </a:t>
+            </a:r>
+            <a:br>
+              <a:rPr lang="en-CA" sz="2400" dirty="0"/>
+            </a:br>
+            <a:r>
+              <a:rPr lang="en-CA" sz="2400" dirty="0"/>
+              <a:t>Node size and edge width = out-strength</a:t>
+            </a:r>
+            <a:br>
+              <a:rPr lang="en-CA" sz="2400" dirty="0"/>
+            </a:br>
+            <a:r>
+              <a:rPr lang="en-CA" sz="2400" dirty="0">
+                <a:highlight>
+                  <a:srgbClr val="FFFF00"/>
+                </a:highlight>
+              </a:rPr>
+              <a:t>Data from Trial #1 not recoverable due to missing videos</a:t>
             </a:r>
           </a:p>
         </p:txBody>
@@ -4305,7 +4450,144 @@
     </p:spTree>
     <p:extLst>
       <p:ext uri="{BB962C8B-B14F-4D97-AF65-F5344CB8AC3E}">
-        <p14:creationId xmlns:p14="http://schemas.microsoft.com/office/powerpoint/2010/main" val="270700745"/>
+        <p14:creationId xmlns:p14="http://schemas.microsoft.com/office/powerpoint/2010/main" val="2143164178"/>
+      </p:ext>
+    </p:extLst>
+  </p:cSld>
+  <p:clrMapOvr>
+    <a:masterClrMapping/>
+  </p:clrMapOvr>
+</p:sld>
+</file>
+
+<file path=ppt/slides/slide16.xml><?xml version="1.0" encoding="utf-8"?>
+<p:sld xmlns:a="http://schemas.openxmlformats.org/drawingml/2006/main" xmlns:r="http://schemas.openxmlformats.org/officeDocument/2006/relationships" xmlns:p="http://schemas.openxmlformats.org/presentationml/2006/main">
+  <p:cSld>
+    <p:spTree>
+      <p:nvGrpSpPr>
+        <p:cNvPr id="1" name=""/>
+        <p:cNvGrpSpPr/>
+        <p:nvPr/>
+      </p:nvGrpSpPr>
+      <p:grpSpPr>
+        <a:xfrm>
+          <a:off x="0" y="0"/>
+          <a:ext cx="0" cy="0"/>
+          <a:chOff x="0" y="0"/>
+          <a:chExt cx="0" cy="0"/>
+        </a:xfrm>
+      </p:grpSpPr>
+      <p:pic>
+        <p:nvPicPr>
+          <p:cNvPr id="3" name="Picture 2">
+            <a:extLst>
+              <a:ext uri="{FF2B5EF4-FFF2-40B4-BE49-F238E27FC236}">
+                <a16:creationId xmlns:a16="http://schemas.microsoft.com/office/drawing/2014/main" id="{215D77BB-E750-A279-9561-1FF9E016D01F}"/>
+              </a:ext>
+            </a:extLst>
+          </p:cNvPr>
+          <p:cNvPicPr>
+            <a:picLocks noChangeAspect="1"/>
+          </p:cNvPicPr>
+          <p:nvPr/>
+        </p:nvPicPr>
+        <p:blipFill>
+          <a:blip r:embed="rId2"/>
+          <a:stretch>
+            <a:fillRect/>
+          </a:stretch>
+        </p:blipFill>
+        <p:spPr>
+          <a:xfrm>
+            <a:off x="3594875" y="1485629"/>
+            <a:ext cx="3915321" cy="3886742"/>
+          </a:xfrm>
+          <a:prstGeom prst="rect">
+            <a:avLst/>
+          </a:prstGeom>
+        </p:spPr>
+      </p:pic>
+      <p:pic>
+        <p:nvPicPr>
+          <p:cNvPr id="5" name="Picture 4">
+            <a:extLst>
+              <a:ext uri="{FF2B5EF4-FFF2-40B4-BE49-F238E27FC236}">
+                <a16:creationId xmlns:a16="http://schemas.microsoft.com/office/drawing/2014/main" id="{D28F3ECD-3584-1FA0-8C11-3C9680741245}"/>
+              </a:ext>
+            </a:extLst>
+          </p:cNvPr>
+          <p:cNvPicPr>
+            <a:picLocks noChangeAspect="1"/>
+          </p:cNvPicPr>
+          <p:nvPr/>
+        </p:nvPicPr>
+        <p:blipFill>
+          <a:blip r:embed="rId3"/>
+          <a:stretch>
+            <a:fillRect/>
+          </a:stretch>
+        </p:blipFill>
+        <p:spPr>
+          <a:xfrm>
+            <a:off x="7835581" y="1485629"/>
+            <a:ext cx="3715268" cy="4124901"/>
+          </a:xfrm>
+          <a:prstGeom prst="rect">
+            <a:avLst/>
+          </a:prstGeom>
+        </p:spPr>
+      </p:pic>
+      <p:sp>
+        <p:nvSpPr>
+          <p:cNvPr id="6" name="TextBox 5">
+            <a:extLst>
+              <a:ext uri="{FF2B5EF4-FFF2-40B4-BE49-F238E27FC236}">
+                <a16:creationId xmlns:a16="http://schemas.microsoft.com/office/drawing/2014/main" id="{010FA93D-95F5-7C29-2D45-BC25121A8DAA}"/>
+              </a:ext>
+            </a:extLst>
+          </p:cNvPr>
+          <p:cNvSpPr txBox="1"/>
+          <p:nvPr/>
+        </p:nvSpPr>
+        <p:spPr>
+          <a:xfrm>
+            <a:off x="192367" y="207034"/>
+            <a:ext cx="7317829" cy="830997"/>
+          </a:xfrm>
+          <a:prstGeom prst="rect">
+            <a:avLst/>
+          </a:prstGeom>
+          <a:noFill/>
+        </p:spPr>
+        <p:txBody>
+          <a:bodyPr wrap="square" rtlCol="0">
+            <a:spAutoFit/>
+          </a:bodyPr>
+          <a:lstStyle/>
+          <a:p>
+            <a:r>
+              <a:rPr lang="en-CA" sz="2400" dirty="0"/>
+              <a:t>Colony 47 (No Choice) Out-strength distributions</a:t>
+            </a:r>
+            <a:br>
+              <a:rPr lang="en-CA" sz="2400" dirty="0"/>
+            </a:br>
+            <a:r>
+              <a:rPr lang="en-CA" sz="2400" dirty="0">
+                <a:highlight>
+                  <a:srgbClr val="FFFF00"/>
+                </a:highlight>
+              </a:rPr>
+              <a:t>Data from Trial #1 not recoverable due to missing videos</a:t>
+            </a:r>
+            <a:endParaRPr lang="en-CA" sz="2400" dirty="0"/>
+          </a:p>
+        </p:txBody>
+      </p:sp>
+    </p:spTree>
+    <p:extLst>
+      <p:ext uri="{BB962C8B-B14F-4D97-AF65-F5344CB8AC3E}">
+        <p14:creationId xmlns:p14="http://schemas.microsoft.com/office/powerpoint/2010/main" val="2959445256"/>
       </p:ext>
     </p:extLst>
   </p:cSld>

</xml_diff>

<commit_message>
Update network to include colour info
</commit_message>
<xml_diff>
--- a/ant_sna_network_diagrams.pptx
+++ b/ant_sna_network_diagrams.pptx
@@ -6,21 +6,22 @@
   </p:sldMasterIdLst>
   <p:sldIdLst>
     <p:sldId id="258" r:id="rId2"/>
-    <p:sldId id="260" r:id="rId3"/>
-    <p:sldId id="261" r:id="rId4"/>
-    <p:sldId id="262" r:id="rId5"/>
-    <p:sldId id="263" r:id="rId6"/>
-    <p:sldId id="264" r:id="rId7"/>
-    <p:sldId id="265" r:id="rId8"/>
-    <p:sldId id="266" r:id="rId9"/>
-    <p:sldId id="267" r:id="rId10"/>
-    <p:sldId id="268" r:id="rId11"/>
-    <p:sldId id="271" r:id="rId12"/>
-    <p:sldId id="272" r:id="rId13"/>
-    <p:sldId id="273" r:id="rId14"/>
-    <p:sldId id="274" r:id="rId15"/>
-    <p:sldId id="275" r:id="rId16"/>
-    <p:sldId id="276" r:id="rId17"/>
+    <p:sldId id="277" r:id="rId3"/>
+    <p:sldId id="260" r:id="rId4"/>
+    <p:sldId id="261" r:id="rId5"/>
+    <p:sldId id="262" r:id="rId6"/>
+    <p:sldId id="263" r:id="rId7"/>
+    <p:sldId id="264" r:id="rId8"/>
+    <p:sldId id="265" r:id="rId9"/>
+    <p:sldId id="266" r:id="rId10"/>
+    <p:sldId id="267" r:id="rId11"/>
+    <p:sldId id="268" r:id="rId12"/>
+    <p:sldId id="271" r:id="rId13"/>
+    <p:sldId id="272" r:id="rId14"/>
+    <p:sldId id="273" r:id="rId15"/>
+    <p:sldId id="274" r:id="rId16"/>
+    <p:sldId id="275" r:id="rId17"/>
+    <p:sldId id="276" r:id="rId18"/>
   </p:sldIdLst>
   <p:sldSz cx="12192000" cy="6858000"/>
   <p:notesSz cx="6858000" cy="9144000"/>
@@ -276,7 +277,7 @@
           <a:p>
             <a:fld id="{860C609C-6F01-41DE-9C81-127E5EFAB8EE}" type="datetimeFigureOut">
               <a:rPr lang="en-CA" smtClean="0"/>
-              <a:t>2022-05-16</a:t>
+              <a:t>2022-08-01</a:t>
             </a:fld>
             <a:endParaRPr lang="en-CA"/>
           </a:p>
@@ -476,7 +477,7 @@
           <a:p>
             <a:fld id="{860C609C-6F01-41DE-9C81-127E5EFAB8EE}" type="datetimeFigureOut">
               <a:rPr lang="en-CA" smtClean="0"/>
-              <a:t>2022-05-16</a:t>
+              <a:t>2022-08-01</a:t>
             </a:fld>
             <a:endParaRPr lang="en-CA"/>
           </a:p>
@@ -686,7 +687,7 @@
           <a:p>
             <a:fld id="{860C609C-6F01-41DE-9C81-127E5EFAB8EE}" type="datetimeFigureOut">
               <a:rPr lang="en-CA" smtClean="0"/>
-              <a:t>2022-05-16</a:t>
+              <a:t>2022-08-01</a:t>
             </a:fld>
             <a:endParaRPr lang="en-CA"/>
           </a:p>
@@ -886,7 +887,7 @@
           <a:p>
             <a:fld id="{860C609C-6F01-41DE-9C81-127E5EFAB8EE}" type="datetimeFigureOut">
               <a:rPr lang="en-CA" smtClean="0"/>
-              <a:t>2022-05-16</a:t>
+              <a:t>2022-08-01</a:t>
             </a:fld>
             <a:endParaRPr lang="en-CA"/>
           </a:p>
@@ -1162,7 +1163,7 @@
           <a:p>
             <a:fld id="{860C609C-6F01-41DE-9C81-127E5EFAB8EE}" type="datetimeFigureOut">
               <a:rPr lang="en-CA" smtClean="0"/>
-              <a:t>2022-05-16</a:t>
+              <a:t>2022-08-01</a:t>
             </a:fld>
             <a:endParaRPr lang="en-CA"/>
           </a:p>
@@ -1430,7 +1431,7 @@
           <a:p>
             <a:fld id="{860C609C-6F01-41DE-9C81-127E5EFAB8EE}" type="datetimeFigureOut">
               <a:rPr lang="en-CA" smtClean="0"/>
-              <a:t>2022-05-16</a:t>
+              <a:t>2022-08-01</a:t>
             </a:fld>
             <a:endParaRPr lang="en-CA"/>
           </a:p>
@@ -1845,7 +1846,7 @@
           <a:p>
             <a:fld id="{860C609C-6F01-41DE-9C81-127E5EFAB8EE}" type="datetimeFigureOut">
               <a:rPr lang="en-CA" smtClean="0"/>
-              <a:t>2022-05-16</a:t>
+              <a:t>2022-08-01</a:t>
             </a:fld>
             <a:endParaRPr lang="en-CA"/>
           </a:p>
@@ -1987,7 +1988,7 @@
           <a:p>
             <a:fld id="{860C609C-6F01-41DE-9C81-127E5EFAB8EE}" type="datetimeFigureOut">
               <a:rPr lang="en-CA" smtClean="0"/>
-              <a:t>2022-05-16</a:t>
+              <a:t>2022-08-01</a:t>
             </a:fld>
             <a:endParaRPr lang="en-CA"/>
           </a:p>
@@ -2100,7 +2101,7 @@
           <a:p>
             <a:fld id="{860C609C-6F01-41DE-9C81-127E5EFAB8EE}" type="datetimeFigureOut">
               <a:rPr lang="en-CA" smtClean="0"/>
-              <a:t>2022-05-16</a:t>
+              <a:t>2022-08-01</a:t>
             </a:fld>
             <a:endParaRPr lang="en-CA"/>
           </a:p>
@@ -2413,7 +2414,7 @@
           <a:p>
             <a:fld id="{860C609C-6F01-41DE-9C81-127E5EFAB8EE}" type="datetimeFigureOut">
               <a:rPr lang="en-CA" smtClean="0"/>
-              <a:t>2022-05-16</a:t>
+              <a:t>2022-08-01</a:t>
             </a:fld>
             <a:endParaRPr lang="en-CA"/>
           </a:p>
@@ -2702,7 +2703,7 @@
           <a:p>
             <a:fld id="{860C609C-6F01-41DE-9C81-127E5EFAB8EE}" type="datetimeFigureOut">
               <a:rPr lang="en-CA" smtClean="0"/>
-              <a:t>2022-05-16</a:t>
+              <a:t>2022-08-01</a:t>
             </a:fld>
             <a:endParaRPr lang="en-CA"/>
           </a:p>
@@ -2945,7 +2946,7 @@
           <a:p>
             <a:fld id="{860C609C-6F01-41DE-9C81-127E5EFAB8EE}" type="datetimeFigureOut">
               <a:rPr lang="en-CA" smtClean="0"/>
-              <a:t>2022-05-16</a:t>
+              <a:t>2022-08-01</a:t>
             </a:fld>
             <a:endParaRPr lang="en-CA"/>
           </a:p>
@@ -3550,7 +3551,7 @@
           <p:cNvPr id="3" name="Picture 2">
             <a:extLst>
               <a:ext uri="{FF2B5EF4-FFF2-40B4-BE49-F238E27FC236}">
-                <a16:creationId xmlns:a16="http://schemas.microsoft.com/office/drawing/2014/main" id="{8E24DD40-6EE5-4E45-A1A2-5422D0A003B2}"/>
+                <a16:creationId xmlns:a16="http://schemas.microsoft.com/office/drawing/2014/main" id="{A0D58741-9B07-4E36-AC29-7B9A949B35CF}"/>
               </a:ext>
             </a:extLst>
           </p:cNvPr>
@@ -3567,8 +3568,8 @@
         </p:blipFill>
         <p:spPr>
           <a:xfrm>
-            <a:off x="140834" y="1532404"/>
-            <a:ext cx="4210638" cy="4448796"/>
+            <a:off x="983901" y="1748850"/>
+            <a:ext cx="3277057" cy="3029373"/>
           </a:xfrm>
           <a:prstGeom prst="rect">
             <a:avLst/>
@@ -3577,10 +3578,10 @@
       </p:pic>
       <p:pic>
         <p:nvPicPr>
-          <p:cNvPr id="5" name="Picture 4">
-            <a:extLst>
-              <a:ext uri="{FF2B5EF4-FFF2-40B4-BE49-F238E27FC236}">
-                <a16:creationId xmlns:a16="http://schemas.microsoft.com/office/drawing/2014/main" id="{F7049116-E608-41F6-AF5D-B6E39DACD6A2}"/>
+          <p:cNvPr id="7" name="Picture 6">
+            <a:extLst>
+              <a:ext uri="{FF2B5EF4-FFF2-40B4-BE49-F238E27FC236}">
+                <a16:creationId xmlns:a16="http://schemas.microsoft.com/office/drawing/2014/main" id="{A9571C71-A87D-4C1C-9BCF-A3C8003CBB3A}"/>
               </a:ext>
             </a:extLst>
           </p:cNvPr>
@@ -3597,8 +3598,8 @@
         </p:blipFill>
         <p:spPr>
           <a:xfrm>
-            <a:off x="4351472" y="1656246"/>
-            <a:ext cx="3991532" cy="4201111"/>
+            <a:off x="7810623" y="1748850"/>
+            <a:ext cx="3175808" cy="3029373"/>
           </a:xfrm>
           <a:prstGeom prst="rect">
             <a:avLst/>
@@ -3607,10 +3608,10 @@
       </p:pic>
       <p:pic>
         <p:nvPicPr>
-          <p:cNvPr id="7" name="Picture 6">
-            <a:extLst>
-              <a:ext uri="{FF2B5EF4-FFF2-40B4-BE49-F238E27FC236}">
-                <a16:creationId xmlns:a16="http://schemas.microsoft.com/office/drawing/2014/main" id="{CEDD8E31-D46C-4B5A-AFCE-B6F98A86E33A}"/>
+          <p:cNvPr id="9" name="Picture 8">
+            <a:extLst>
+              <a:ext uri="{FF2B5EF4-FFF2-40B4-BE49-F238E27FC236}">
+                <a16:creationId xmlns:a16="http://schemas.microsoft.com/office/drawing/2014/main" id="{B0AAFE15-C099-47C1-A10E-82E5105D23F2}"/>
               </a:ext>
             </a:extLst>
           </p:cNvPr>
@@ -3627,8 +3628,8 @@
         </p:blipFill>
         <p:spPr>
           <a:xfrm>
-            <a:off x="8010123" y="1727693"/>
-            <a:ext cx="3858163" cy="4191585"/>
+            <a:off x="4363026" y="1748850"/>
+            <a:ext cx="3240722" cy="2990059"/>
           </a:xfrm>
           <a:prstGeom prst="rect">
             <a:avLst/>
@@ -3637,10 +3638,10 @@
       </p:pic>
       <p:sp>
         <p:nvSpPr>
-          <p:cNvPr id="8" name="TextBox 7">
-            <a:extLst>
-              <a:ext uri="{FF2B5EF4-FFF2-40B4-BE49-F238E27FC236}">
-                <a16:creationId xmlns:a16="http://schemas.microsoft.com/office/drawing/2014/main" id="{61025945-BA99-4E6D-9A7A-8E8CA96A5D66}"/>
+          <p:cNvPr id="10" name="TextBox 9">
+            <a:extLst>
+              <a:ext uri="{FF2B5EF4-FFF2-40B4-BE49-F238E27FC236}">
+                <a16:creationId xmlns:a16="http://schemas.microsoft.com/office/drawing/2014/main" id="{B82E68FD-A873-46FB-9E59-C912140D82B5}"/>
               </a:ext>
             </a:extLst>
           </p:cNvPr>
@@ -3649,8 +3650,8 @@
         </p:nvSpPr>
         <p:spPr>
           <a:xfrm>
-            <a:off x="276045" y="396815"/>
-            <a:ext cx="7317829" cy="461665"/>
+            <a:off x="97720" y="257478"/>
+            <a:ext cx="5819955" cy="830997"/>
           </a:xfrm>
           <a:prstGeom prst="rect">
             <a:avLst/>
@@ -3665,7 +3666,14 @@
           <a:p>
             <a:r>
               <a:rPr lang="en-CA" sz="2400" dirty="0"/>
-              <a:t>Colony 60 (No Choice) Out-strength distributions</a:t>
+              <a:t>Colony 60 (No-Choice) </a:t>
+            </a:r>
+            <a:br>
+              <a:rPr lang="en-CA" sz="2400" dirty="0"/>
+            </a:br>
+            <a:r>
+              <a:rPr lang="en-CA" sz="2400" dirty="0"/>
+              <a:t>Node size and edge width = out-strength</a:t>
             </a:r>
           </a:p>
         </p:txBody>
@@ -3673,7 +3681,7 @@
     </p:spTree>
     <p:extLst>
       <p:ext uri="{BB962C8B-B14F-4D97-AF65-F5344CB8AC3E}">
-        <p14:creationId xmlns:p14="http://schemas.microsoft.com/office/powerpoint/2010/main" val="3954940762"/>
+        <p14:creationId xmlns:p14="http://schemas.microsoft.com/office/powerpoint/2010/main" val="3610900390"/>
       </p:ext>
     </p:extLst>
   </p:cSld>
@@ -3700,54 +3708,12 @@
           <a:chExt cx="0" cy="0"/>
         </a:xfrm>
       </p:grpSpPr>
-      <p:sp>
-        <p:nvSpPr>
-          <p:cNvPr id="2" name="TextBox 1">
-            <a:extLst>
-              <a:ext uri="{FF2B5EF4-FFF2-40B4-BE49-F238E27FC236}">
-                <a16:creationId xmlns:a16="http://schemas.microsoft.com/office/drawing/2014/main" id="{3F85D553-D8C2-48EC-A2F9-303B64EEA259}"/>
-              </a:ext>
-            </a:extLst>
-          </p:cNvPr>
-          <p:cNvSpPr txBox="1"/>
-          <p:nvPr/>
-        </p:nvSpPr>
-        <p:spPr>
-          <a:xfrm>
-            <a:off x="115138" y="301021"/>
-            <a:ext cx="5819955" cy="830997"/>
-          </a:xfrm>
-          <a:prstGeom prst="rect">
-            <a:avLst/>
-          </a:prstGeom>
-          <a:noFill/>
-        </p:spPr>
-        <p:txBody>
-          <a:bodyPr wrap="square" rtlCol="0">
-            <a:spAutoFit/>
-          </a:bodyPr>
-          <a:lstStyle/>
-          <a:p>
-            <a:r>
-              <a:rPr lang="en-CA" sz="2400" dirty="0"/>
-              <a:t>Colony 59 (No-Choice) </a:t>
-            </a:r>
-            <a:br>
-              <a:rPr lang="en-CA" sz="2400" dirty="0"/>
-            </a:br>
-            <a:r>
-              <a:rPr lang="en-CA" sz="2400" dirty="0"/>
-              <a:t>Node size and edge width = out-strength</a:t>
-            </a:r>
-          </a:p>
-        </p:txBody>
-      </p:sp>
       <p:pic>
         <p:nvPicPr>
-          <p:cNvPr id="4" name="Picture 3">
-            <a:extLst>
-              <a:ext uri="{FF2B5EF4-FFF2-40B4-BE49-F238E27FC236}">
-                <a16:creationId xmlns:a16="http://schemas.microsoft.com/office/drawing/2014/main" id="{8855A9EA-DAE4-4DD5-8165-6F800722BFA2}"/>
+          <p:cNvPr id="3" name="Picture 2">
+            <a:extLst>
+              <a:ext uri="{FF2B5EF4-FFF2-40B4-BE49-F238E27FC236}">
+                <a16:creationId xmlns:a16="http://schemas.microsoft.com/office/drawing/2014/main" id="{8E24DD40-6EE5-4E45-A1A2-5422D0A003B2}"/>
               </a:ext>
             </a:extLst>
           </p:cNvPr>
@@ -3764,8 +3730,8 @@
         </p:blipFill>
         <p:spPr>
           <a:xfrm>
-            <a:off x="115138" y="1767491"/>
-            <a:ext cx="3732243" cy="3740687"/>
+            <a:off x="140834" y="1532404"/>
+            <a:ext cx="4210638" cy="4448796"/>
           </a:xfrm>
           <a:prstGeom prst="rect">
             <a:avLst/>
@@ -3774,10 +3740,10 @@
       </p:pic>
       <p:pic>
         <p:nvPicPr>
-          <p:cNvPr id="6" name="Picture 5">
-            <a:extLst>
-              <a:ext uri="{FF2B5EF4-FFF2-40B4-BE49-F238E27FC236}">
-                <a16:creationId xmlns:a16="http://schemas.microsoft.com/office/drawing/2014/main" id="{EDDD6532-839B-4212-8F42-A969A2611586}"/>
+          <p:cNvPr id="5" name="Picture 4">
+            <a:extLst>
+              <a:ext uri="{FF2B5EF4-FFF2-40B4-BE49-F238E27FC236}">
+                <a16:creationId xmlns:a16="http://schemas.microsoft.com/office/drawing/2014/main" id="{F7049116-E608-41F6-AF5D-B6E39DACD6A2}"/>
               </a:ext>
             </a:extLst>
           </p:cNvPr>
@@ -3794,8 +3760,8 @@
         </p:blipFill>
         <p:spPr>
           <a:xfrm>
-            <a:off x="3937587" y="1757965"/>
-            <a:ext cx="3753826" cy="3745353"/>
+            <a:off x="4351472" y="1656246"/>
+            <a:ext cx="3991532" cy="4201111"/>
           </a:xfrm>
           <a:prstGeom prst="rect">
             <a:avLst/>
@@ -3804,10 +3770,10 @@
       </p:pic>
       <p:pic>
         <p:nvPicPr>
-          <p:cNvPr id="8" name="Picture 7">
-            <a:extLst>
-              <a:ext uri="{FF2B5EF4-FFF2-40B4-BE49-F238E27FC236}">
-                <a16:creationId xmlns:a16="http://schemas.microsoft.com/office/drawing/2014/main" id="{05317A3B-4968-4497-8664-62D6567FFE10}"/>
+          <p:cNvPr id="7" name="Picture 6">
+            <a:extLst>
+              <a:ext uri="{FF2B5EF4-FFF2-40B4-BE49-F238E27FC236}">
+                <a16:creationId xmlns:a16="http://schemas.microsoft.com/office/drawing/2014/main" id="{CEDD8E31-D46C-4B5A-AFCE-B6F98A86E33A}"/>
               </a:ext>
             </a:extLst>
           </p:cNvPr>
@@ -3824,18 +3790,53 @@
         </p:blipFill>
         <p:spPr>
           <a:xfrm>
-            <a:off x="7866224" y="1757965"/>
-            <a:ext cx="3753846" cy="3745353"/>
+            <a:off x="8010123" y="1727693"/>
+            <a:ext cx="3858163" cy="4191585"/>
           </a:xfrm>
           <a:prstGeom prst="rect">
             <a:avLst/>
           </a:prstGeom>
         </p:spPr>
       </p:pic>
+      <p:sp>
+        <p:nvSpPr>
+          <p:cNvPr id="8" name="TextBox 7">
+            <a:extLst>
+              <a:ext uri="{FF2B5EF4-FFF2-40B4-BE49-F238E27FC236}">
+                <a16:creationId xmlns:a16="http://schemas.microsoft.com/office/drawing/2014/main" id="{61025945-BA99-4E6D-9A7A-8E8CA96A5D66}"/>
+              </a:ext>
+            </a:extLst>
+          </p:cNvPr>
+          <p:cNvSpPr txBox="1"/>
+          <p:nvPr/>
+        </p:nvSpPr>
+        <p:spPr>
+          <a:xfrm>
+            <a:off x="276045" y="396815"/>
+            <a:ext cx="7317829" cy="461665"/>
+          </a:xfrm>
+          <a:prstGeom prst="rect">
+            <a:avLst/>
+          </a:prstGeom>
+          <a:noFill/>
+        </p:spPr>
+        <p:txBody>
+          <a:bodyPr wrap="square" rtlCol="0">
+            <a:spAutoFit/>
+          </a:bodyPr>
+          <a:lstStyle/>
+          <a:p>
+            <a:r>
+              <a:rPr lang="en-CA" sz="2400" dirty="0"/>
+              <a:t>Colony 60 (No Choice) Out-strength distributions</a:t>
+            </a:r>
+          </a:p>
+        </p:txBody>
+      </p:sp>
     </p:spTree>
     <p:extLst>
       <p:ext uri="{BB962C8B-B14F-4D97-AF65-F5344CB8AC3E}">
-        <p14:creationId xmlns:p14="http://schemas.microsoft.com/office/powerpoint/2010/main" val="1818028940"/>
+        <p14:creationId xmlns:p14="http://schemas.microsoft.com/office/powerpoint/2010/main" val="3954940762"/>
       </p:ext>
     </p:extLst>
   </p:cSld>
@@ -3862,12 +3863,54 @@
           <a:chExt cx="0" cy="0"/>
         </a:xfrm>
       </p:grpSpPr>
+      <p:sp>
+        <p:nvSpPr>
+          <p:cNvPr id="2" name="TextBox 1">
+            <a:extLst>
+              <a:ext uri="{FF2B5EF4-FFF2-40B4-BE49-F238E27FC236}">
+                <a16:creationId xmlns:a16="http://schemas.microsoft.com/office/drawing/2014/main" id="{3F85D553-D8C2-48EC-A2F9-303B64EEA259}"/>
+              </a:ext>
+            </a:extLst>
+          </p:cNvPr>
+          <p:cNvSpPr txBox="1"/>
+          <p:nvPr/>
+        </p:nvSpPr>
+        <p:spPr>
+          <a:xfrm>
+            <a:off x="115138" y="301021"/>
+            <a:ext cx="5819955" cy="830997"/>
+          </a:xfrm>
+          <a:prstGeom prst="rect">
+            <a:avLst/>
+          </a:prstGeom>
+          <a:noFill/>
+        </p:spPr>
+        <p:txBody>
+          <a:bodyPr wrap="square" rtlCol="0">
+            <a:spAutoFit/>
+          </a:bodyPr>
+          <a:lstStyle/>
+          <a:p>
+            <a:r>
+              <a:rPr lang="en-CA" sz="2400" dirty="0"/>
+              <a:t>Colony 59 (No-Choice) </a:t>
+            </a:r>
+            <a:br>
+              <a:rPr lang="en-CA" sz="2400" dirty="0"/>
+            </a:br>
+            <a:r>
+              <a:rPr lang="en-CA" sz="2400" dirty="0"/>
+              <a:t>Node size and edge width = out-strength</a:t>
+            </a:r>
+          </a:p>
+        </p:txBody>
+      </p:sp>
       <p:pic>
         <p:nvPicPr>
-          <p:cNvPr id="3" name="Picture 2">
-            <a:extLst>
-              <a:ext uri="{FF2B5EF4-FFF2-40B4-BE49-F238E27FC236}">
-                <a16:creationId xmlns:a16="http://schemas.microsoft.com/office/drawing/2014/main" id="{1440CF21-8133-4CE9-B27F-5616CCDAAE97}"/>
+          <p:cNvPr id="4" name="Picture 3">
+            <a:extLst>
+              <a:ext uri="{FF2B5EF4-FFF2-40B4-BE49-F238E27FC236}">
+                <a16:creationId xmlns:a16="http://schemas.microsoft.com/office/drawing/2014/main" id="{8855A9EA-DAE4-4DD5-8165-6F800722BFA2}"/>
               </a:ext>
             </a:extLst>
           </p:cNvPr>
@@ -3884,8 +3927,8 @@
         </p:blipFill>
         <p:spPr>
           <a:xfrm>
-            <a:off x="89869" y="1626770"/>
-            <a:ext cx="4096322" cy="4277322"/>
+            <a:off x="115138" y="1767491"/>
+            <a:ext cx="3732243" cy="3740687"/>
           </a:xfrm>
           <a:prstGeom prst="rect">
             <a:avLst/>
@@ -3894,10 +3937,10 @@
       </p:pic>
       <p:pic>
         <p:nvPicPr>
-          <p:cNvPr id="5" name="Picture 4">
-            <a:extLst>
-              <a:ext uri="{FF2B5EF4-FFF2-40B4-BE49-F238E27FC236}">
-                <a16:creationId xmlns:a16="http://schemas.microsoft.com/office/drawing/2014/main" id="{801ACA9E-2B66-426A-8953-6A3E2CE1286C}"/>
+          <p:cNvPr id="6" name="Picture 5">
+            <a:extLst>
+              <a:ext uri="{FF2B5EF4-FFF2-40B4-BE49-F238E27FC236}">
+                <a16:creationId xmlns:a16="http://schemas.microsoft.com/office/drawing/2014/main" id="{EDDD6532-839B-4212-8F42-A969A2611586}"/>
               </a:ext>
             </a:extLst>
           </p:cNvPr>
@@ -3914,8 +3957,8 @@
         </p:blipFill>
         <p:spPr>
           <a:xfrm>
-            <a:off x="4204806" y="1583901"/>
-            <a:ext cx="3801005" cy="4363059"/>
+            <a:off x="3937587" y="1757965"/>
+            <a:ext cx="3753826" cy="3745353"/>
           </a:xfrm>
           <a:prstGeom prst="rect">
             <a:avLst/>
@@ -3924,10 +3967,10 @@
       </p:pic>
       <p:pic>
         <p:nvPicPr>
-          <p:cNvPr id="7" name="Picture 6">
-            <a:extLst>
-              <a:ext uri="{FF2B5EF4-FFF2-40B4-BE49-F238E27FC236}">
-                <a16:creationId xmlns:a16="http://schemas.microsoft.com/office/drawing/2014/main" id="{7028DE9E-B3CC-499A-B62D-40C77C65E1F6}"/>
+          <p:cNvPr id="8" name="Picture 7">
+            <a:extLst>
+              <a:ext uri="{FF2B5EF4-FFF2-40B4-BE49-F238E27FC236}">
+                <a16:creationId xmlns:a16="http://schemas.microsoft.com/office/drawing/2014/main" id="{05317A3B-4968-4497-8664-62D6567FFE10}"/>
               </a:ext>
             </a:extLst>
           </p:cNvPr>
@@ -3944,53 +3987,18 @@
         </p:blipFill>
         <p:spPr>
           <a:xfrm>
-            <a:off x="8024426" y="1679164"/>
-            <a:ext cx="3829584" cy="4267796"/>
+            <a:off x="7866224" y="1757965"/>
+            <a:ext cx="3753846" cy="3745353"/>
           </a:xfrm>
           <a:prstGeom prst="rect">
             <a:avLst/>
           </a:prstGeom>
         </p:spPr>
       </p:pic>
-      <p:sp>
-        <p:nvSpPr>
-          <p:cNvPr id="8" name="TextBox 7">
-            <a:extLst>
-              <a:ext uri="{FF2B5EF4-FFF2-40B4-BE49-F238E27FC236}">
-                <a16:creationId xmlns:a16="http://schemas.microsoft.com/office/drawing/2014/main" id="{CE74092B-7992-41BE-BFB0-985E508ABD3A}"/>
-              </a:ext>
-            </a:extLst>
-          </p:cNvPr>
-          <p:cNvSpPr txBox="1"/>
-          <p:nvPr/>
-        </p:nvSpPr>
-        <p:spPr>
-          <a:xfrm>
-            <a:off x="276045" y="396815"/>
-            <a:ext cx="7317829" cy="461665"/>
-          </a:xfrm>
-          <a:prstGeom prst="rect">
-            <a:avLst/>
-          </a:prstGeom>
-          <a:noFill/>
-        </p:spPr>
-        <p:txBody>
-          <a:bodyPr wrap="square" rtlCol="0">
-            <a:spAutoFit/>
-          </a:bodyPr>
-          <a:lstStyle/>
-          <a:p>
-            <a:r>
-              <a:rPr lang="en-CA" sz="2400" dirty="0"/>
-              <a:t>Colony 59 (No Choice) Out-strength distributions</a:t>
-            </a:r>
-          </a:p>
-        </p:txBody>
-      </p:sp>
     </p:spTree>
     <p:extLst>
       <p:ext uri="{BB962C8B-B14F-4D97-AF65-F5344CB8AC3E}">
-        <p14:creationId xmlns:p14="http://schemas.microsoft.com/office/powerpoint/2010/main" val="270700745"/>
+        <p14:creationId xmlns:p14="http://schemas.microsoft.com/office/powerpoint/2010/main" val="1818028940"/>
       </p:ext>
     </p:extLst>
   </p:cSld>
@@ -4022,7 +4030,7 @@
           <p:cNvPr id="3" name="Picture 2">
             <a:extLst>
               <a:ext uri="{FF2B5EF4-FFF2-40B4-BE49-F238E27FC236}">
-                <a16:creationId xmlns:a16="http://schemas.microsoft.com/office/drawing/2014/main" id="{A186DC00-3AD8-B050-AD43-00D3AECD6DFD}"/>
+                <a16:creationId xmlns:a16="http://schemas.microsoft.com/office/drawing/2014/main" id="{1440CF21-8133-4CE9-B27F-5616CCDAAE97}"/>
               </a:ext>
             </a:extLst>
           </p:cNvPr>
@@ -4039,8 +4047,8 @@
         </p:blipFill>
         <p:spPr>
           <a:xfrm>
-            <a:off x="460436" y="1592213"/>
-            <a:ext cx="3690307" cy="3690307"/>
+            <a:off x="89869" y="1626770"/>
+            <a:ext cx="4096322" cy="4277322"/>
           </a:xfrm>
           <a:prstGeom prst="rect">
             <a:avLst/>
@@ -4052,7 +4060,7 @@
           <p:cNvPr id="5" name="Picture 4">
             <a:extLst>
               <a:ext uri="{FF2B5EF4-FFF2-40B4-BE49-F238E27FC236}">
-                <a16:creationId xmlns:a16="http://schemas.microsoft.com/office/drawing/2014/main" id="{567E9BD1-7184-18FA-31AB-72249B8D2AA6}"/>
+                <a16:creationId xmlns:a16="http://schemas.microsoft.com/office/drawing/2014/main" id="{801ACA9E-2B66-426A-8953-6A3E2CE1286C}"/>
               </a:ext>
             </a:extLst>
           </p:cNvPr>
@@ -4069,8 +4077,8 @@
         </p:blipFill>
         <p:spPr>
           <a:xfrm>
-            <a:off x="4310909" y="1592213"/>
-            <a:ext cx="3690307" cy="3657211"/>
+            <a:off x="4204806" y="1583901"/>
+            <a:ext cx="3801005" cy="4363059"/>
           </a:xfrm>
           <a:prstGeom prst="rect">
             <a:avLst/>
@@ -4082,7 +4090,7 @@
           <p:cNvPr id="7" name="Picture 6">
             <a:extLst>
               <a:ext uri="{FF2B5EF4-FFF2-40B4-BE49-F238E27FC236}">
-                <a16:creationId xmlns:a16="http://schemas.microsoft.com/office/drawing/2014/main" id="{22CF92A5-0498-9629-4963-81B24B786145}"/>
+                <a16:creationId xmlns:a16="http://schemas.microsoft.com/office/drawing/2014/main" id="{7028DE9E-B3CC-499A-B62D-40C77C65E1F6}"/>
               </a:ext>
             </a:extLst>
           </p:cNvPr>
@@ -4099,8 +4107,8 @@
         </p:blipFill>
         <p:spPr>
           <a:xfrm>
-            <a:off x="8096901" y="1592214"/>
-            <a:ext cx="3690307" cy="3673572"/>
+            <a:off x="8024426" y="1679164"/>
+            <a:ext cx="3829584" cy="4267796"/>
           </a:xfrm>
           <a:prstGeom prst="rect">
             <a:avLst/>
@@ -4112,7 +4120,7 @@
           <p:cNvPr id="8" name="TextBox 7">
             <a:extLst>
               <a:ext uri="{FF2B5EF4-FFF2-40B4-BE49-F238E27FC236}">
-                <a16:creationId xmlns:a16="http://schemas.microsoft.com/office/drawing/2014/main" id="{F4675F2C-10A0-8681-AE19-67AC8F443F2F}"/>
+                <a16:creationId xmlns:a16="http://schemas.microsoft.com/office/drawing/2014/main" id="{CE74092B-7992-41BE-BFB0-985E508ABD3A}"/>
               </a:ext>
             </a:extLst>
           </p:cNvPr>
@@ -4121,8 +4129,8 @@
         </p:nvSpPr>
         <p:spPr>
           <a:xfrm>
-            <a:off x="115138" y="301021"/>
-            <a:ext cx="5819955" cy="830997"/>
+            <a:off x="276045" y="396815"/>
+            <a:ext cx="7317829" cy="461665"/>
           </a:xfrm>
           <a:prstGeom prst="rect">
             <a:avLst/>
@@ -4137,14 +4145,7 @@
           <a:p>
             <a:r>
               <a:rPr lang="en-CA" sz="2400" dirty="0"/>
-              <a:t>Colony 45 (No-Choice) </a:t>
-            </a:r>
-            <a:br>
-              <a:rPr lang="en-CA" sz="2400" dirty="0"/>
-            </a:br>
-            <a:r>
-              <a:rPr lang="en-CA" sz="2400" dirty="0"/>
-              <a:t>Node size and edge width = out-strength</a:t>
+              <a:t>Colony 59 (No Choice) Out-strength distributions</a:t>
             </a:r>
           </a:p>
         </p:txBody>
@@ -4152,7 +4153,7 @@
     </p:spTree>
     <p:extLst>
       <p:ext uri="{BB962C8B-B14F-4D97-AF65-F5344CB8AC3E}">
-        <p14:creationId xmlns:p14="http://schemas.microsoft.com/office/powerpoint/2010/main" val="873420916"/>
+        <p14:creationId xmlns:p14="http://schemas.microsoft.com/office/powerpoint/2010/main" val="270700745"/>
       </p:ext>
     </p:extLst>
   </p:cSld>
@@ -4184,7 +4185,7 @@
           <p:cNvPr id="3" name="Picture 2">
             <a:extLst>
               <a:ext uri="{FF2B5EF4-FFF2-40B4-BE49-F238E27FC236}">
-                <a16:creationId xmlns:a16="http://schemas.microsoft.com/office/drawing/2014/main" id="{FC469D9B-CB31-B5A7-E809-73397F505B66}"/>
+                <a16:creationId xmlns:a16="http://schemas.microsoft.com/office/drawing/2014/main" id="{A186DC00-3AD8-B050-AD43-00D3AECD6DFD}"/>
               </a:ext>
             </a:extLst>
           </p:cNvPr>
@@ -4201,55 +4202,20 @@
         </p:blipFill>
         <p:spPr>
           <a:xfrm>
-            <a:off x="339753" y="1641696"/>
-            <a:ext cx="3886742" cy="4143953"/>
+            <a:off x="460436" y="1592213"/>
+            <a:ext cx="3690307" cy="3690307"/>
           </a:xfrm>
           <a:prstGeom prst="rect">
             <a:avLst/>
           </a:prstGeom>
         </p:spPr>
       </p:pic>
-      <p:sp>
-        <p:nvSpPr>
-          <p:cNvPr id="4" name="TextBox 3">
-            <a:extLst>
-              <a:ext uri="{FF2B5EF4-FFF2-40B4-BE49-F238E27FC236}">
-                <a16:creationId xmlns:a16="http://schemas.microsoft.com/office/drawing/2014/main" id="{E801D2D0-AED4-04E7-3FAD-801913734852}"/>
-              </a:ext>
-            </a:extLst>
-          </p:cNvPr>
-          <p:cNvSpPr txBox="1"/>
-          <p:nvPr/>
-        </p:nvSpPr>
-        <p:spPr>
-          <a:xfrm>
-            <a:off x="276045" y="396815"/>
-            <a:ext cx="7317829" cy="461665"/>
-          </a:xfrm>
-          <a:prstGeom prst="rect">
-            <a:avLst/>
-          </a:prstGeom>
-          <a:noFill/>
-        </p:spPr>
-        <p:txBody>
-          <a:bodyPr wrap="square" rtlCol="0">
-            <a:spAutoFit/>
-          </a:bodyPr>
-          <a:lstStyle/>
-          <a:p>
-            <a:r>
-              <a:rPr lang="en-CA" sz="2400" dirty="0"/>
-              <a:t>Colony 45 (No Choice) Out-strength distributions</a:t>
-            </a:r>
-          </a:p>
-        </p:txBody>
-      </p:sp>
       <p:pic>
         <p:nvPicPr>
-          <p:cNvPr id="6" name="Picture 5">
-            <a:extLst>
-              <a:ext uri="{FF2B5EF4-FFF2-40B4-BE49-F238E27FC236}">
-                <a16:creationId xmlns:a16="http://schemas.microsoft.com/office/drawing/2014/main" id="{D4E953AA-6CC5-50B8-30F9-E7CB71D68081}"/>
+          <p:cNvPr id="5" name="Picture 4">
+            <a:extLst>
+              <a:ext uri="{FF2B5EF4-FFF2-40B4-BE49-F238E27FC236}">
+                <a16:creationId xmlns:a16="http://schemas.microsoft.com/office/drawing/2014/main" id="{567E9BD1-7184-18FA-31AB-72249B8D2AA6}"/>
               </a:ext>
             </a:extLst>
           </p:cNvPr>
@@ -4266,8 +4232,8 @@
         </p:blipFill>
         <p:spPr>
           <a:xfrm>
-            <a:off x="4276538" y="1434289"/>
-            <a:ext cx="3429479" cy="4334480"/>
+            <a:off x="4310909" y="1592213"/>
+            <a:ext cx="3690307" cy="3657211"/>
           </a:xfrm>
           <a:prstGeom prst="rect">
             <a:avLst/>
@@ -4276,10 +4242,10 @@
       </p:pic>
       <p:pic>
         <p:nvPicPr>
-          <p:cNvPr id="8" name="Picture 7">
-            <a:extLst>
-              <a:ext uri="{FF2B5EF4-FFF2-40B4-BE49-F238E27FC236}">
-                <a16:creationId xmlns:a16="http://schemas.microsoft.com/office/drawing/2014/main" id="{89DFDEE6-6065-B9FA-C0EF-F8239074A74B}"/>
+          <p:cNvPr id="7" name="Picture 6">
+            <a:extLst>
+              <a:ext uri="{FF2B5EF4-FFF2-40B4-BE49-F238E27FC236}">
+                <a16:creationId xmlns:a16="http://schemas.microsoft.com/office/drawing/2014/main" id="{22CF92A5-0498-9629-4963-81B24B786145}"/>
               </a:ext>
             </a:extLst>
           </p:cNvPr>
@@ -4296,18 +4262,60 @@
         </p:blipFill>
         <p:spPr>
           <a:xfrm>
-            <a:off x="7984293" y="1548605"/>
-            <a:ext cx="3762900" cy="4220164"/>
+            <a:off x="8096901" y="1592214"/>
+            <a:ext cx="3690307" cy="3673572"/>
           </a:xfrm>
           <a:prstGeom prst="rect">
             <a:avLst/>
           </a:prstGeom>
         </p:spPr>
       </p:pic>
+      <p:sp>
+        <p:nvSpPr>
+          <p:cNvPr id="8" name="TextBox 7">
+            <a:extLst>
+              <a:ext uri="{FF2B5EF4-FFF2-40B4-BE49-F238E27FC236}">
+                <a16:creationId xmlns:a16="http://schemas.microsoft.com/office/drawing/2014/main" id="{F4675F2C-10A0-8681-AE19-67AC8F443F2F}"/>
+              </a:ext>
+            </a:extLst>
+          </p:cNvPr>
+          <p:cNvSpPr txBox="1"/>
+          <p:nvPr/>
+        </p:nvSpPr>
+        <p:spPr>
+          <a:xfrm>
+            <a:off x="115138" y="301021"/>
+            <a:ext cx="5819955" cy="830997"/>
+          </a:xfrm>
+          <a:prstGeom prst="rect">
+            <a:avLst/>
+          </a:prstGeom>
+          <a:noFill/>
+        </p:spPr>
+        <p:txBody>
+          <a:bodyPr wrap="square" rtlCol="0">
+            <a:spAutoFit/>
+          </a:bodyPr>
+          <a:lstStyle/>
+          <a:p>
+            <a:r>
+              <a:rPr lang="en-CA" sz="2400" dirty="0"/>
+              <a:t>Colony 45 (No-Choice) </a:t>
+            </a:r>
+            <a:br>
+              <a:rPr lang="en-CA" sz="2400" dirty="0"/>
+            </a:br>
+            <a:r>
+              <a:rPr lang="en-CA" sz="2400" dirty="0"/>
+              <a:t>Node size and edge width = out-strength</a:t>
+            </a:r>
+          </a:p>
+        </p:txBody>
+      </p:sp>
     </p:spTree>
     <p:extLst>
       <p:ext uri="{BB962C8B-B14F-4D97-AF65-F5344CB8AC3E}">
-        <p14:creationId xmlns:p14="http://schemas.microsoft.com/office/powerpoint/2010/main" val="3535751779"/>
+        <p14:creationId xmlns:p14="http://schemas.microsoft.com/office/powerpoint/2010/main" val="873420916"/>
       </p:ext>
     </p:extLst>
   </p:cSld>
@@ -4339,6 +4347,161 @@
           <p:cNvPr id="3" name="Picture 2">
             <a:extLst>
               <a:ext uri="{FF2B5EF4-FFF2-40B4-BE49-F238E27FC236}">
+                <a16:creationId xmlns:a16="http://schemas.microsoft.com/office/drawing/2014/main" id="{FC469D9B-CB31-B5A7-E809-73397F505B66}"/>
+              </a:ext>
+            </a:extLst>
+          </p:cNvPr>
+          <p:cNvPicPr>
+            <a:picLocks noChangeAspect="1"/>
+          </p:cNvPicPr>
+          <p:nvPr/>
+        </p:nvPicPr>
+        <p:blipFill>
+          <a:blip r:embed="rId2"/>
+          <a:stretch>
+            <a:fillRect/>
+          </a:stretch>
+        </p:blipFill>
+        <p:spPr>
+          <a:xfrm>
+            <a:off x="339753" y="1641696"/>
+            <a:ext cx="3886742" cy="4143953"/>
+          </a:xfrm>
+          <a:prstGeom prst="rect">
+            <a:avLst/>
+          </a:prstGeom>
+        </p:spPr>
+      </p:pic>
+      <p:sp>
+        <p:nvSpPr>
+          <p:cNvPr id="4" name="TextBox 3">
+            <a:extLst>
+              <a:ext uri="{FF2B5EF4-FFF2-40B4-BE49-F238E27FC236}">
+                <a16:creationId xmlns:a16="http://schemas.microsoft.com/office/drawing/2014/main" id="{E801D2D0-AED4-04E7-3FAD-801913734852}"/>
+              </a:ext>
+            </a:extLst>
+          </p:cNvPr>
+          <p:cNvSpPr txBox="1"/>
+          <p:nvPr/>
+        </p:nvSpPr>
+        <p:spPr>
+          <a:xfrm>
+            <a:off x="276045" y="396815"/>
+            <a:ext cx="7317829" cy="461665"/>
+          </a:xfrm>
+          <a:prstGeom prst="rect">
+            <a:avLst/>
+          </a:prstGeom>
+          <a:noFill/>
+        </p:spPr>
+        <p:txBody>
+          <a:bodyPr wrap="square" rtlCol="0">
+            <a:spAutoFit/>
+          </a:bodyPr>
+          <a:lstStyle/>
+          <a:p>
+            <a:r>
+              <a:rPr lang="en-CA" sz="2400" dirty="0"/>
+              <a:t>Colony 45 (No Choice) Out-strength distributions</a:t>
+            </a:r>
+          </a:p>
+        </p:txBody>
+      </p:sp>
+      <p:pic>
+        <p:nvPicPr>
+          <p:cNvPr id="6" name="Picture 5">
+            <a:extLst>
+              <a:ext uri="{FF2B5EF4-FFF2-40B4-BE49-F238E27FC236}">
+                <a16:creationId xmlns:a16="http://schemas.microsoft.com/office/drawing/2014/main" id="{D4E953AA-6CC5-50B8-30F9-E7CB71D68081}"/>
+              </a:ext>
+            </a:extLst>
+          </p:cNvPr>
+          <p:cNvPicPr>
+            <a:picLocks noChangeAspect="1"/>
+          </p:cNvPicPr>
+          <p:nvPr/>
+        </p:nvPicPr>
+        <p:blipFill>
+          <a:blip r:embed="rId3"/>
+          <a:stretch>
+            <a:fillRect/>
+          </a:stretch>
+        </p:blipFill>
+        <p:spPr>
+          <a:xfrm>
+            <a:off x="4276538" y="1434289"/>
+            <a:ext cx="3429479" cy="4334480"/>
+          </a:xfrm>
+          <a:prstGeom prst="rect">
+            <a:avLst/>
+          </a:prstGeom>
+        </p:spPr>
+      </p:pic>
+      <p:pic>
+        <p:nvPicPr>
+          <p:cNvPr id="8" name="Picture 7">
+            <a:extLst>
+              <a:ext uri="{FF2B5EF4-FFF2-40B4-BE49-F238E27FC236}">
+                <a16:creationId xmlns:a16="http://schemas.microsoft.com/office/drawing/2014/main" id="{89DFDEE6-6065-B9FA-C0EF-F8239074A74B}"/>
+              </a:ext>
+            </a:extLst>
+          </p:cNvPr>
+          <p:cNvPicPr>
+            <a:picLocks noChangeAspect="1"/>
+          </p:cNvPicPr>
+          <p:nvPr/>
+        </p:nvPicPr>
+        <p:blipFill>
+          <a:blip r:embed="rId4"/>
+          <a:stretch>
+            <a:fillRect/>
+          </a:stretch>
+        </p:blipFill>
+        <p:spPr>
+          <a:xfrm>
+            <a:off x="7984293" y="1548605"/>
+            <a:ext cx="3762900" cy="4220164"/>
+          </a:xfrm>
+          <a:prstGeom prst="rect">
+            <a:avLst/>
+          </a:prstGeom>
+        </p:spPr>
+      </p:pic>
+    </p:spTree>
+    <p:extLst>
+      <p:ext uri="{BB962C8B-B14F-4D97-AF65-F5344CB8AC3E}">
+        <p14:creationId xmlns:p14="http://schemas.microsoft.com/office/powerpoint/2010/main" val="3535751779"/>
+      </p:ext>
+    </p:extLst>
+  </p:cSld>
+  <p:clrMapOvr>
+    <a:masterClrMapping/>
+  </p:clrMapOvr>
+</p:sld>
+</file>
+
+<file path=ppt/slides/slide16.xml><?xml version="1.0" encoding="utf-8"?>
+<p:sld xmlns:a="http://schemas.openxmlformats.org/drawingml/2006/main" xmlns:r="http://schemas.openxmlformats.org/officeDocument/2006/relationships" xmlns:p="http://schemas.openxmlformats.org/presentationml/2006/main">
+  <p:cSld>
+    <p:spTree>
+      <p:nvGrpSpPr>
+        <p:cNvPr id="1" name=""/>
+        <p:cNvGrpSpPr/>
+        <p:nvPr/>
+      </p:nvGrpSpPr>
+      <p:grpSpPr>
+        <a:xfrm>
+          <a:off x="0" y="0"/>
+          <a:ext cx="0" cy="0"/>
+          <a:chOff x="0" y="0"/>
+          <a:chExt cx="0" cy="0"/>
+        </a:xfrm>
+      </p:grpSpPr>
+      <p:pic>
+        <p:nvPicPr>
+          <p:cNvPr id="3" name="Picture 2">
+            <a:extLst>
+              <a:ext uri="{FF2B5EF4-FFF2-40B4-BE49-F238E27FC236}">
                 <a16:creationId xmlns:a16="http://schemas.microsoft.com/office/drawing/2014/main" id="{7C642770-CAC4-1590-36EB-4A98458D7BFA}"/>
               </a:ext>
             </a:extLst>
@@ -4460,7 +4623,7 @@
 </p:sld>
 </file>
 
-<file path=ppt/slides/slide16.xml><?xml version="1.0" encoding="utf-8"?>
+<file path=ppt/slides/slide17.xml><?xml version="1.0" encoding="utf-8"?>
 <p:sld xmlns:a="http://schemas.openxmlformats.org/drawingml/2006/main" xmlns:r="http://schemas.openxmlformats.org/officeDocument/2006/relationships" xmlns:p="http://schemas.openxmlformats.org/presentationml/2006/main">
   <p:cSld>
     <p:spTree>
@@ -4614,47 +4777,41 @@
           <a:chExt cx="0" cy="0"/>
         </a:xfrm>
       </p:grpSpPr>
-      <p:sp>
-        <p:nvSpPr>
-          <p:cNvPr id="2" name="TextBox 1">
-            <a:extLst>
-              <a:ext uri="{FF2B5EF4-FFF2-40B4-BE49-F238E27FC236}">
-                <a16:creationId xmlns:a16="http://schemas.microsoft.com/office/drawing/2014/main" id="{B4F91EB7-659B-4EA1-93A0-DC127E30B6B4}"/>
-              </a:ext>
-            </a:extLst>
-          </p:cNvPr>
-          <p:cNvSpPr txBox="1"/>
-          <p:nvPr/>
-        </p:nvSpPr>
-        <p:spPr>
-          <a:xfrm>
-            <a:off x="276045" y="396815"/>
-            <a:ext cx="5819955" cy="461665"/>
-          </a:xfrm>
-          <a:prstGeom prst="rect">
-            <a:avLst/>
-          </a:prstGeom>
-          <a:noFill/>
-        </p:spPr>
-        <p:txBody>
-          <a:bodyPr wrap="square" rtlCol="0">
-            <a:spAutoFit/>
-          </a:bodyPr>
-          <a:lstStyle/>
-          <a:p>
-            <a:r>
-              <a:rPr lang="en-CA" sz="2400" dirty="0"/>
-              <a:t>Colony 42 (Choice) Out-strength distributions</a:t>
-            </a:r>
-          </a:p>
-        </p:txBody>
-      </p:sp>
       <p:pic>
         <p:nvPicPr>
-          <p:cNvPr id="4" name="Picture 3">
-            <a:extLst>
-              <a:ext uri="{FF2B5EF4-FFF2-40B4-BE49-F238E27FC236}">
-                <a16:creationId xmlns:a16="http://schemas.microsoft.com/office/drawing/2014/main" id="{D4A40DBE-3894-453A-968D-F58B93BFA155}"/>
+          <p:cNvPr id="5" name="Picture 4">
+            <a:extLst>
+              <a:ext uri="{FF2B5EF4-FFF2-40B4-BE49-F238E27FC236}">
+                <a16:creationId xmlns:a16="http://schemas.microsoft.com/office/drawing/2014/main" id="{E62410F2-103E-3EAA-9DF3-0FBE9B26F4FE}"/>
+              </a:ext>
+            </a:extLst>
+          </p:cNvPr>
+          <p:cNvPicPr>
+            <a:picLocks noChangeAspect="1"/>
+          </p:cNvPicPr>
+          <p:nvPr/>
+        </p:nvPicPr>
+        <p:blipFill rotWithShape="1">
+          <a:blip r:embed="rId2"/>
+          <a:srcRect t="3868"/>
+          <a:stretch/>
+        </p:blipFill>
+        <p:spPr>
+          <a:xfrm>
+            <a:off x="164631" y="1428251"/>
+            <a:ext cx="4047266" cy="3785184"/>
+          </a:xfrm>
+          <a:prstGeom prst="rect">
+            <a:avLst/>
+          </a:prstGeom>
+        </p:spPr>
+      </p:pic>
+      <p:pic>
+        <p:nvPicPr>
+          <p:cNvPr id="7" name="Picture 6">
+            <a:extLst>
+              <a:ext uri="{FF2B5EF4-FFF2-40B4-BE49-F238E27FC236}">
+                <a16:creationId xmlns:a16="http://schemas.microsoft.com/office/drawing/2014/main" id="{0547CD50-9492-8141-D9CA-1684559294A0}"/>
               </a:ext>
             </a:extLst>
           </p:cNvPr>
@@ -4664,15 +4821,15 @@
           <p:nvPr/>
         </p:nvPicPr>
         <p:blipFill>
-          <a:blip r:embed="rId2"/>
+          <a:blip r:embed="rId3"/>
           <a:stretch>
             <a:fillRect/>
           </a:stretch>
         </p:blipFill>
         <p:spPr>
           <a:xfrm>
-            <a:off x="0" y="1924539"/>
-            <a:ext cx="4204247" cy="3008921"/>
+            <a:off x="4072367" y="1347743"/>
+            <a:ext cx="4047266" cy="4082006"/>
           </a:xfrm>
           <a:prstGeom prst="rect">
             <a:avLst/>
@@ -4681,39 +4838,10 @@
       </p:pic>
       <p:pic>
         <p:nvPicPr>
-          <p:cNvPr id="6" name="Picture 5">
-            <a:extLst>
-              <a:ext uri="{FF2B5EF4-FFF2-40B4-BE49-F238E27FC236}">
-                <a16:creationId xmlns:a16="http://schemas.microsoft.com/office/drawing/2014/main" id="{44A90EFA-C000-4482-AA4C-0B770AF9271F}"/>
-              </a:ext>
-            </a:extLst>
-          </p:cNvPr>
-          <p:cNvPicPr>
-            <a:picLocks noChangeAspect="1"/>
-          </p:cNvPicPr>
-          <p:nvPr/>
-        </p:nvPicPr>
-        <p:blipFill rotWithShape="1">
-          <a:blip r:embed="rId3"/>
-          <a:srcRect r="12597"/>
-          <a:stretch/>
-        </p:blipFill>
-        <p:spPr>
-          <a:xfrm>
-            <a:off x="4082351" y="1794150"/>
-            <a:ext cx="3692934" cy="3310841"/>
-          </a:xfrm>
-          <a:prstGeom prst="rect">
-            <a:avLst/>
-          </a:prstGeom>
-        </p:spPr>
-      </p:pic>
-      <p:pic>
-        <p:nvPicPr>
-          <p:cNvPr id="8" name="Picture 7">
-            <a:extLst>
-              <a:ext uri="{FF2B5EF4-FFF2-40B4-BE49-F238E27FC236}">
-                <a16:creationId xmlns:a16="http://schemas.microsoft.com/office/drawing/2014/main" id="{47A745C0-3E3E-44CC-8764-216C20B9FB2E}"/>
+          <p:cNvPr id="11" name="Picture 10">
+            <a:extLst>
+              <a:ext uri="{FF2B5EF4-FFF2-40B4-BE49-F238E27FC236}">
+                <a16:creationId xmlns:a16="http://schemas.microsoft.com/office/drawing/2014/main" id="{5773FE4E-9BC7-4F64-6C2B-478BC57DE8B8}"/>
               </a:ext>
             </a:extLst>
           </p:cNvPr>
@@ -4730,18 +4858,60 @@
         </p:blipFill>
         <p:spPr>
           <a:xfrm>
-            <a:off x="7852921" y="1834145"/>
-            <a:ext cx="4204247" cy="3230850"/>
+            <a:off x="8371306" y="1674184"/>
+            <a:ext cx="3481388" cy="3539251"/>
           </a:xfrm>
           <a:prstGeom prst="rect">
             <a:avLst/>
           </a:prstGeom>
         </p:spPr>
       </p:pic>
+      <p:sp>
+        <p:nvSpPr>
+          <p:cNvPr id="12" name="TextBox 11">
+            <a:extLst>
+              <a:ext uri="{FF2B5EF4-FFF2-40B4-BE49-F238E27FC236}">
+                <a16:creationId xmlns:a16="http://schemas.microsoft.com/office/drawing/2014/main" id="{BF903655-3F84-23F7-37F9-F4C1199ACAAA}"/>
+              </a:ext>
+            </a:extLst>
+          </p:cNvPr>
+          <p:cNvSpPr txBox="1"/>
+          <p:nvPr/>
+        </p:nvSpPr>
+        <p:spPr>
+          <a:xfrm>
+            <a:off x="276045" y="396815"/>
+            <a:ext cx="5819955" cy="830997"/>
+          </a:xfrm>
+          <a:prstGeom prst="rect">
+            <a:avLst/>
+          </a:prstGeom>
+          <a:noFill/>
+        </p:spPr>
+        <p:txBody>
+          <a:bodyPr wrap="square" rtlCol="0">
+            <a:spAutoFit/>
+          </a:bodyPr>
+          <a:lstStyle/>
+          <a:p>
+            <a:r>
+              <a:rPr lang="en-CA" sz="2400" dirty="0"/>
+              <a:t>Colony 42 (Choice) </a:t>
+            </a:r>
+            <a:br>
+              <a:rPr lang="en-CA" sz="2400" dirty="0"/>
+            </a:br>
+            <a:r>
+              <a:rPr lang="en-CA" sz="2400" dirty="0"/>
+              <a:t>Node size and edge width = out-strength</a:t>
+            </a:r>
+          </a:p>
+        </p:txBody>
+      </p:sp>
     </p:spTree>
     <p:extLst>
       <p:ext uri="{BB962C8B-B14F-4D97-AF65-F5344CB8AC3E}">
-        <p14:creationId xmlns:p14="http://schemas.microsoft.com/office/powerpoint/2010/main" val="2526662059"/>
+        <p14:creationId xmlns:p14="http://schemas.microsoft.com/office/powerpoint/2010/main" val="3017436826"/>
       </p:ext>
     </p:extLst>
   </p:cSld>
@@ -4768,12 +4938,77 @@
           <a:chExt cx="0" cy="0"/>
         </a:xfrm>
       </p:grpSpPr>
+      <p:sp>
+        <p:nvSpPr>
+          <p:cNvPr id="2" name="TextBox 1">
+            <a:extLst>
+              <a:ext uri="{FF2B5EF4-FFF2-40B4-BE49-F238E27FC236}">
+                <a16:creationId xmlns:a16="http://schemas.microsoft.com/office/drawing/2014/main" id="{B4F91EB7-659B-4EA1-93A0-DC127E30B6B4}"/>
+              </a:ext>
+            </a:extLst>
+          </p:cNvPr>
+          <p:cNvSpPr txBox="1"/>
+          <p:nvPr/>
+        </p:nvSpPr>
+        <p:spPr>
+          <a:xfrm>
+            <a:off x="276045" y="396815"/>
+            <a:ext cx="5819955" cy="461665"/>
+          </a:xfrm>
+          <a:prstGeom prst="rect">
+            <a:avLst/>
+          </a:prstGeom>
+          <a:noFill/>
+        </p:spPr>
+        <p:txBody>
+          <a:bodyPr wrap="square" rtlCol="0">
+            <a:spAutoFit/>
+          </a:bodyPr>
+          <a:lstStyle/>
+          <a:p>
+            <a:r>
+              <a:rPr lang="en-CA" sz="2400" dirty="0"/>
+              <a:t>Colony 42 (Choice) Out-strength distributions</a:t>
+            </a:r>
+          </a:p>
+        </p:txBody>
+      </p:sp>
       <p:pic>
         <p:nvPicPr>
-          <p:cNvPr id="13" name="Picture 12">
-            <a:extLst>
-              <a:ext uri="{FF2B5EF4-FFF2-40B4-BE49-F238E27FC236}">
-                <a16:creationId xmlns:a16="http://schemas.microsoft.com/office/drawing/2014/main" id="{41450CB3-946B-495B-B169-D271D7AF2BD5}"/>
+          <p:cNvPr id="4" name="Picture 3">
+            <a:extLst>
+              <a:ext uri="{FF2B5EF4-FFF2-40B4-BE49-F238E27FC236}">
+                <a16:creationId xmlns:a16="http://schemas.microsoft.com/office/drawing/2014/main" id="{D4A40DBE-3894-453A-968D-F58B93BFA155}"/>
+              </a:ext>
+            </a:extLst>
+          </p:cNvPr>
+          <p:cNvPicPr>
+            <a:picLocks noChangeAspect="1"/>
+          </p:cNvPicPr>
+          <p:nvPr/>
+        </p:nvPicPr>
+        <p:blipFill>
+          <a:blip r:embed="rId2"/>
+          <a:stretch>
+            <a:fillRect/>
+          </a:stretch>
+        </p:blipFill>
+        <p:spPr>
+          <a:xfrm>
+            <a:off x="0" y="1924539"/>
+            <a:ext cx="4204247" cy="3008921"/>
+          </a:xfrm>
+          <a:prstGeom prst="rect">
+            <a:avLst/>
+          </a:prstGeom>
+        </p:spPr>
+      </p:pic>
+      <p:pic>
+        <p:nvPicPr>
+          <p:cNvPr id="6" name="Picture 5">
+            <a:extLst>
+              <a:ext uri="{FF2B5EF4-FFF2-40B4-BE49-F238E27FC236}">
+                <a16:creationId xmlns:a16="http://schemas.microsoft.com/office/drawing/2014/main" id="{44A90EFA-C000-4482-AA4C-0B770AF9271F}"/>
               </a:ext>
             </a:extLst>
           </p:cNvPr>
@@ -4783,14 +5018,14 @@
           <p:nvPr/>
         </p:nvPicPr>
         <p:blipFill rotWithShape="1">
-          <a:blip r:embed="rId2"/>
-          <a:srcRect t="-1" b="205"/>
+          <a:blip r:embed="rId3"/>
+          <a:srcRect r="12597"/>
           <a:stretch/>
         </p:blipFill>
         <p:spPr>
           <a:xfrm>
-            <a:off x="8023041" y="1292364"/>
-            <a:ext cx="3958091" cy="3967613"/>
+            <a:off x="4082351" y="1794150"/>
+            <a:ext cx="3692934" cy="3310841"/>
           </a:xfrm>
           <a:prstGeom prst="rect">
             <a:avLst/>
@@ -4799,40 +5034,10 @@
       </p:pic>
       <p:pic>
         <p:nvPicPr>
-          <p:cNvPr id="15" name="Picture 14">
-            <a:extLst>
-              <a:ext uri="{FF2B5EF4-FFF2-40B4-BE49-F238E27FC236}">
-                <a16:creationId xmlns:a16="http://schemas.microsoft.com/office/drawing/2014/main" id="{FADEA677-9A5A-4561-95D5-50822D578C27}"/>
-              </a:ext>
-            </a:extLst>
-          </p:cNvPr>
-          <p:cNvPicPr>
-            <a:picLocks noChangeAspect="1"/>
-          </p:cNvPicPr>
-          <p:nvPr/>
-        </p:nvPicPr>
-        <p:blipFill>
-          <a:blip r:embed="rId3"/>
-          <a:stretch>
-            <a:fillRect/>
-          </a:stretch>
-        </p:blipFill>
-        <p:spPr>
-          <a:xfrm>
-            <a:off x="4038329" y="1292364"/>
-            <a:ext cx="3976003" cy="3966947"/>
-          </a:xfrm>
-          <a:prstGeom prst="rect">
-            <a:avLst/>
-          </a:prstGeom>
-        </p:spPr>
-      </p:pic>
-      <p:pic>
-        <p:nvPicPr>
-          <p:cNvPr id="17" name="Picture 16">
-            <a:extLst>
-              <a:ext uri="{FF2B5EF4-FFF2-40B4-BE49-F238E27FC236}">
-                <a16:creationId xmlns:a16="http://schemas.microsoft.com/office/drawing/2014/main" id="{1F34889E-F23D-4D4C-AA15-496D7985B624}"/>
+          <p:cNvPr id="8" name="Picture 7">
+            <a:extLst>
+              <a:ext uri="{FF2B5EF4-FFF2-40B4-BE49-F238E27FC236}">
+                <a16:creationId xmlns:a16="http://schemas.microsoft.com/office/drawing/2014/main" id="{47A745C0-3E3E-44CC-8764-216C20B9FB2E}"/>
               </a:ext>
             </a:extLst>
           </p:cNvPr>
@@ -4849,60 +5054,18 @@
         </p:blipFill>
         <p:spPr>
           <a:xfrm>
-            <a:off x="97720" y="1292364"/>
-            <a:ext cx="3958091" cy="3966947"/>
+            <a:off x="7852921" y="1834145"/>
+            <a:ext cx="4204247" cy="3230850"/>
           </a:xfrm>
           <a:prstGeom prst="rect">
             <a:avLst/>
           </a:prstGeom>
         </p:spPr>
       </p:pic>
-      <p:sp>
-        <p:nvSpPr>
-          <p:cNvPr id="18" name="TextBox 17">
-            <a:extLst>
-              <a:ext uri="{FF2B5EF4-FFF2-40B4-BE49-F238E27FC236}">
-                <a16:creationId xmlns:a16="http://schemas.microsoft.com/office/drawing/2014/main" id="{224D3460-8BC3-4EA4-A1C2-85A0C3526B2E}"/>
-              </a:ext>
-            </a:extLst>
-          </p:cNvPr>
-          <p:cNvSpPr txBox="1"/>
-          <p:nvPr/>
-        </p:nvSpPr>
-        <p:spPr>
-          <a:xfrm>
-            <a:off x="97720" y="257478"/>
-            <a:ext cx="5819955" cy="830997"/>
-          </a:xfrm>
-          <a:prstGeom prst="rect">
-            <a:avLst/>
-          </a:prstGeom>
-          <a:noFill/>
-        </p:spPr>
-        <p:txBody>
-          <a:bodyPr wrap="square" rtlCol="0">
-            <a:spAutoFit/>
-          </a:bodyPr>
-          <a:lstStyle/>
-          <a:p>
-            <a:r>
-              <a:rPr lang="en-CA" sz="2400" dirty="0"/>
-              <a:t>Colony 55 (Choice) </a:t>
-            </a:r>
-            <a:br>
-              <a:rPr lang="en-CA" sz="2400" dirty="0"/>
-            </a:br>
-            <a:r>
-              <a:rPr lang="en-CA" sz="2400" dirty="0"/>
-              <a:t>Node size and edge width = out-strength</a:t>
-            </a:r>
-          </a:p>
-        </p:txBody>
-      </p:sp>
     </p:spTree>
     <p:extLst>
       <p:ext uri="{BB962C8B-B14F-4D97-AF65-F5344CB8AC3E}">
-        <p14:creationId xmlns:p14="http://schemas.microsoft.com/office/powerpoint/2010/main" val="1962464281"/>
+        <p14:creationId xmlns:p14="http://schemas.microsoft.com/office/powerpoint/2010/main" val="2526662059"/>
       </p:ext>
     </p:extLst>
   </p:cSld>
@@ -4929,47 +5092,41 @@
           <a:chExt cx="0" cy="0"/>
         </a:xfrm>
       </p:grpSpPr>
-      <p:sp>
-        <p:nvSpPr>
-          <p:cNvPr id="2" name="TextBox 1">
-            <a:extLst>
-              <a:ext uri="{FF2B5EF4-FFF2-40B4-BE49-F238E27FC236}">
-                <a16:creationId xmlns:a16="http://schemas.microsoft.com/office/drawing/2014/main" id="{B60215E8-44CC-4515-BE41-43049CA361D7}"/>
-              </a:ext>
-            </a:extLst>
-          </p:cNvPr>
-          <p:cNvSpPr txBox="1"/>
-          <p:nvPr/>
-        </p:nvSpPr>
-        <p:spPr>
-          <a:xfrm>
-            <a:off x="276045" y="396815"/>
-            <a:ext cx="5819955" cy="461665"/>
-          </a:xfrm>
-          <a:prstGeom prst="rect">
-            <a:avLst/>
-          </a:prstGeom>
-          <a:noFill/>
-        </p:spPr>
-        <p:txBody>
-          <a:bodyPr wrap="square" rtlCol="0">
-            <a:spAutoFit/>
-          </a:bodyPr>
-          <a:lstStyle/>
-          <a:p>
-            <a:r>
-              <a:rPr lang="en-CA" sz="2400" dirty="0"/>
-              <a:t>Colony 55 (Choice) Out-strength distributions</a:t>
-            </a:r>
-          </a:p>
-        </p:txBody>
-      </p:sp>
       <p:pic>
         <p:nvPicPr>
-          <p:cNvPr id="4" name="Picture 3">
-            <a:extLst>
-              <a:ext uri="{FF2B5EF4-FFF2-40B4-BE49-F238E27FC236}">
-                <a16:creationId xmlns:a16="http://schemas.microsoft.com/office/drawing/2014/main" id="{E2BF022B-CBCC-4D21-8767-00BB0C738BBE}"/>
+          <p:cNvPr id="13" name="Picture 12">
+            <a:extLst>
+              <a:ext uri="{FF2B5EF4-FFF2-40B4-BE49-F238E27FC236}">
+                <a16:creationId xmlns:a16="http://schemas.microsoft.com/office/drawing/2014/main" id="{41450CB3-946B-495B-B169-D271D7AF2BD5}"/>
+              </a:ext>
+            </a:extLst>
+          </p:cNvPr>
+          <p:cNvPicPr>
+            <a:picLocks noChangeAspect="1"/>
+          </p:cNvPicPr>
+          <p:nvPr/>
+        </p:nvPicPr>
+        <p:blipFill rotWithShape="1">
+          <a:blip r:embed="rId2"/>
+          <a:srcRect t="-1" b="205"/>
+          <a:stretch/>
+        </p:blipFill>
+        <p:spPr>
+          <a:xfrm>
+            <a:off x="8023041" y="1292364"/>
+            <a:ext cx="3958091" cy="3967613"/>
+          </a:xfrm>
+          <a:prstGeom prst="rect">
+            <a:avLst/>
+          </a:prstGeom>
+        </p:spPr>
+      </p:pic>
+      <p:pic>
+        <p:nvPicPr>
+          <p:cNvPr id="15" name="Picture 14">
+            <a:extLst>
+              <a:ext uri="{FF2B5EF4-FFF2-40B4-BE49-F238E27FC236}">
+                <a16:creationId xmlns:a16="http://schemas.microsoft.com/office/drawing/2014/main" id="{FADEA677-9A5A-4561-95D5-50822D578C27}"/>
               </a:ext>
             </a:extLst>
           </p:cNvPr>
@@ -4979,15 +5136,15 @@
           <p:nvPr/>
         </p:nvPicPr>
         <p:blipFill>
-          <a:blip r:embed="rId2"/>
+          <a:blip r:embed="rId3"/>
           <a:stretch>
             <a:fillRect/>
           </a:stretch>
         </p:blipFill>
         <p:spPr>
           <a:xfrm>
-            <a:off x="101048" y="1613644"/>
-            <a:ext cx="4030616" cy="3585374"/>
+            <a:off x="4038329" y="1292364"/>
+            <a:ext cx="3976003" cy="3966947"/>
           </a:xfrm>
           <a:prstGeom prst="rect">
             <a:avLst/>
@@ -4996,39 +5153,10 @@
       </p:pic>
       <p:pic>
         <p:nvPicPr>
-          <p:cNvPr id="6" name="Picture 5">
-            <a:extLst>
-              <a:ext uri="{FF2B5EF4-FFF2-40B4-BE49-F238E27FC236}">
-                <a16:creationId xmlns:a16="http://schemas.microsoft.com/office/drawing/2014/main" id="{E5C201F8-3862-48AA-B3BB-FA320904B71F}"/>
-              </a:ext>
-            </a:extLst>
-          </p:cNvPr>
-          <p:cNvPicPr>
-            <a:picLocks noChangeAspect="1"/>
-          </p:cNvPicPr>
-          <p:nvPr/>
-        </p:nvPicPr>
-        <p:blipFill rotWithShape="1">
-          <a:blip r:embed="rId3"/>
-          <a:srcRect l="7007"/>
-          <a:stretch/>
-        </p:blipFill>
-        <p:spPr>
-          <a:xfrm>
-            <a:off x="4130361" y="1547497"/>
-            <a:ext cx="3885460" cy="3693334"/>
-          </a:xfrm>
-          <a:prstGeom prst="rect">
-            <a:avLst/>
-          </a:prstGeom>
-        </p:spPr>
-      </p:pic>
-      <p:pic>
-        <p:nvPicPr>
-          <p:cNvPr id="8" name="Picture 7">
-            <a:extLst>
-              <a:ext uri="{FF2B5EF4-FFF2-40B4-BE49-F238E27FC236}">
-                <a16:creationId xmlns:a16="http://schemas.microsoft.com/office/drawing/2014/main" id="{2E6B849C-23B7-45B1-AEED-D08DF9604A1F}"/>
+          <p:cNvPr id="17" name="Picture 16">
+            <a:extLst>
+              <a:ext uri="{FF2B5EF4-FFF2-40B4-BE49-F238E27FC236}">
+                <a16:creationId xmlns:a16="http://schemas.microsoft.com/office/drawing/2014/main" id="{1F34889E-F23D-4D4C-AA15-496D7985B624}"/>
               </a:ext>
             </a:extLst>
           </p:cNvPr>
@@ -5045,18 +5173,60 @@
         </p:blipFill>
         <p:spPr>
           <a:xfrm>
-            <a:off x="8043824" y="1638039"/>
-            <a:ext cx="4001310" cy="3585374"/>
+            <a:off x="97720" y="1292364"/>
+            <a:ext cx="3958091" cy="3966947"/>
           </a:xfrm>
           <a:prstGeom prst="rect">
             <a:avLst/>
           </a:prstGeom>
         </p:spPr>
       </p:pic>
+      <p:sp>
+        <p:nvSpPr>
+          <p:cNvPr id="18" name="TextBox 17">
+            <a:extLst>
+              <a:ext uri="{FF2B5EF4-FFF2-40B4-BE49-F238E27FC236}">
+                <a16:creationId xmlns:a16="http://schemas.microsoft.com/office/drawing/2014/main" id="{224D3460-8BC3-4EA4-A1C2-85A0C3526B2E}"/>
+              </a:ext>
+            </a:extLst>
+          </p:cNvPr>
+          <p:cNvSpPr txBox="1"/>
+          <p:nvPr/>
+        </p:nvSpPr>
+        <p:spPr>
+          <a:xfrm>
+            <a:off x="97720" y="257478"/>
+            <a:ext cx="5819955" cy="830997"/>
+          </a:xfrm>
+          <a:prstGeom prst="rect">
+            <a:avLst/>
+          </a:prstGeom>
+          <a:noFill/>
+        </p:spPr>
+        <p:txBody>
+          <a:bodyPr wrap="square" rtlCol="0">
+            <a:spAutoFit/>
+          </a:bodyPr>
+          <a:lstStyle/>
+          <a:p>
+            <a:r>
+              <a:rPr lang="en-CA" sz="2400" dirty="0"/>
+              <a:t>Colony 55 (Choice) </a:t>
+            </a:r>
+            <a:br>
+              <a:rPr lang="en-CA" sz="2400" dirty="0"/>
+            </a:br>
+            <a:r>
+              <a:rPr lang="en-CA" sz="2400" dirty="0"/>
+              <a:t>Node size and edge width = out-strength</a:t>
+            </a:r>
+          </a:p>
+        </p:txBody>
+      </p:sp>
     </p:spTree>
     <p:extLst>
       <p:ext uri="{BB962C8B-B14F-4D97-AF65-F5344CB8AC3E}">
-        <p14:creationId xmlns:p14="http://schemas.microsoft.com/office/powerpoint/2010/main" val="3826365856"/>
+        <p14:creationId xmlns:p14="http://schemas.microsoft.com/office/powerpoint/2010/main" val="1962464281"/>
       </p:ext>
     </p:extLst>
   </p:cSld>
@@ -5083,12 +5253,47 @@
           <a:chExt cx="0" cy="0"/>
         </a:xfrm>
       </p:grpSpPr>
+      <p:sp>
+        <p:nvSpPr>
+          <p:cNvPr id="2" name="TextBox 1">
+            <a:extLst>
+              <a:ext uri="{FF2B5EF4-FFF2-40B4-BE49-F238E27FC236}">
+                <a16:creationId xmlns:a16="http://schemas.microsoft.com/office/drawing/2014/main" id="{B60215E8-44CC-4515-BE41-43049CA361D7}"/>
+              </a:ext>
+            </a:extLst>
+          </p:cNvPr>
+          <p:cNvSpPr txBox="1"/>
+          <p:nvPr/>
+        </p:nvSpPr>
+        <p:spPr>
+          <a:xfrm>
+            <a:off x="276045" y="396815"/>
+            <a:ext cx="5819955" cy="461665"/>
+          </a:xfrm>
+          <a:prstGeom prst="rect">
+            <a:avLst/>
+          </a:prstGeom>
+          <a:noFill/>
+        </p:spPr>
+        <p:txBody>
+          <a:bodyPr wrap="square" rtlCol="0">
+            <a:spAutoFit/>
+          </a:bodyPr>
+          <a:lstStyle/>
+          <a:p>
+            <a:r>
+              <a:rPr lang="en-CA" sz="2400" dirty="0"/>
+              <a:t>Colony 55 (Choice) Out-strength distributions</a:t>
+            </a:r>
+          </a:p>
+        </p:txBody>
+      </p:sp>
       <p:pic>
         <p:nvPicPr>
-          <p:cNvPr id="13" name="Picture 12">
-            <a:extLst>
-              <a:ext uri="{FF2B5EF4-FFF2-40B4-BE49-F238E27FC236}">
-                <a16:creationId xmlns:a16="http://schemas.microsoft.com/office/drawing/2014/main" id="{96B42C38-7A84-424D-93A9-D795B13D9218}"/>
+          <p:cNvPr id="4" name="Picture 3">
+            <a:extLst>
+              <a:ext uri="{FF2B5EF4-FFF2-40B4-BE49-F238E27FC236}">
+                <a16:creationId xmlns:a16="http://schemas.microsoft.com/office/drawing/2014/main" id="{E2BF022B-CBCC-4D21-8767-00BB0C738BBE}"/>
               </a:ext>
             </a:extLst>
           </p:cNvPr>
@@ -5105,8 +5310,8 @@
         </p:blipFill>
         <p:spPr>
           <a:xfrm>
-            <a:off x="7774595" y="1795374"/>
-            <a:ext cx="3354767" cy="3267251"/>
+            <a:off x="101048" y="1613644"/>
+            <a:ext cx="4030616" cy="3585374"/>
           </a:xfrm>
           <a:prstGeom prst="rect">
             <a:avLst/>
@@ -5115,10 +5320,10 @@
       </p:pic>
       <p:pic>
         <p:nvPicPr>
-          <p:cNvPr id="15" name="Picture 14">
-            <a:extLst>
-              <a:ext uri="{FF2B5EF4-FFF2-40B4-BE49-F238E27FC236}">
-                <a16:creationId xmlns:a16="http://schemas.microsoft.com/office/drawing/2014/main" id="{55033C64-BF9A-4C0A-8603-EDE0D309A5B6}"/>
+          <p:cNvPr id="6" name="Picture 5">
+            <a:extLst>
+              <a:ext uri="{FF2B5EF4-FFF2-40B4-BE49-F238E27FC236}">
+                <a16:creationId xmlns:a16="http://schemas.microsoft.com/office/drawing/2014/main" id="{E5C201F8-3862-48AA-B3BB-FA320904B71F}"/>
               </a:ext>
             </a:extLst>
           </p:cNvPr>
@@ -5129,13 +5334,13 @@
         </p:nvPicPr>
         <p:blipFill rotWithShape="1">
           <a:blip r:embed="rId3"/>
-          <a:srcRect b="624"/>
+          <a:srcRect l="7007"/>
           <a:stretch/>
         </p:blipFill>
         <p:spPr>
           <a:xfrm>
-            <a:off x="921927" y="1795376"/>
-            <a:ext cx="3286584" cy="3246888"/>
+            <a:off x="4130361" y="1547497"/>
+            <a:ext cx="3885460" cy="3693334"/>
           </a:xfrm>
           <a:prstGeom prst="rect">
             <a:avLst/>
@@ -5144,10 +5349,10 @@
       </p:pic>
       <p:pic>
         <p:nvPicPr>
-          <p:cNvPr id="17" name="Picture 16">
-            <a:extLst>
-              <a:ext uri="{FF2B5EF4-FFF2-40B4-BE49-F238E27FC236}">
-                <a16:creationId xmlns:a16="http://schemas.microsoft.com/office/drawing/2014/main" id="{A00AC703-615A-42B3-B03C-042C34A5C63D}"/>
+          <p:cNvPr id="8" name="Picture 7">
+            <a:extLst>
+              <a:ext uri="{FF2B5EF4-FFF2-40B4-BE49-F238E27FC236}">
+                <a16:creationId xmlns:a16="http://schemas.microsoft.com/office/drawing/2014/main" id="{2E6B849C-23B7-45B1-AEED-D08DF9604A1F}"/>
               </a:ext>
             </a:extLst>
           </p:cNvPr>
@@ -5164,60 +5369,18 @@
         </p:blipFill>
         <p:spPr>
           <a:xfrm>
-            <a:off x="4208510" y="1795374"/>
-            <a:ext cx="3566085" cy="3267251"/>
+            <a:off x="8043824" y="1638039"/>
+            <a:ext cx="4001310" cy="3585374"/>
           </a:xfrm>
           <a:prstGeom prst="rect">
             <a:avLst/>
           </a:prstGeom>
         </p:spPr>
       </p:pic>
-      <p:sp>
-        <p:nvSpPr>
-          <p:cNvPr id="18" name="TextBox 17">
-            <a:extLst>
-              <a:ext uri="{FF2B5EF4-FFF2-40B4-BE49-F238E27FC236}">
-                <a16:creationId xmlns:a16="http://schemas.microsoft.com/office/drawing/2014/main" id="{16BC4561-7E9B-476E-A041-3D06E494B06D}"/>
-              </a:ext>
-            </a:extLst>
-          </p:cNvPr>
-          <p:cNvSpPr txBox="1"/>
-          <p:nvPr/>
-        </p:nvSpPr>
-        <p:spPr>
-          <a:xfrm>
-            <a:off x="97720" y="257478"/>
-            <a:ext cx="5819955" cy="830997"/>
-          </a:xfrm>
-          <a:prstGeom prst="rect">
-            <a:avLst/>
-          </a:prstGeom>
-          <a:noFill/>
-        </p:spPr>
-        <p:txBody>
-          <a:bodyPr wrap="square" rtlCol="0">
-            <a:spAutoFit/>
-          </a:bodyPr>
-          <a:lstStyle/>
-          <a:p>
-            <a:r>
-              <a:rPr lang="en-CA" sz="2400" dirty="0"/>
-              <a:t>Colony 41 (Choice) </a:t>
-            </a:r>
-            <a:br>
-              <a:rPr lang="en-CA" sz="2400" dirty="0"/>
-            </a:br>
-            <a:r>
-              <a:rPr lang="en-CA" sz="2400" dirty="0"/>
-              <a:t>Node size and edge width = out-strength</a:t>
-            </a:r>
-          </a:p>
-        </p:txBody>
-      </p:sp>
     </p:spTree>
     <p:extLst>
       <p:ext uri="{BB962C8B-B14F-4D97-AF65-F5344CB8AC3E}">
-        <p14:creationId xmlns:p14="http://schemas.microsoft.com/office/powerpoint/2010/main" val="894331755"/>
+        <p14:creationId xmlns:p14="http://schemas.microsoft.com/office/powerpoint/2010/main" val="3826365856"/>
       </p:ext>
     </p:extLst>
   </p:cSld>
@@ -5244,47 +5407,12 @@
           <a:chExt cx="0" cy="0"/>
         </a:xfrm>
       </p:grpSpPr>
-      <p:sp>
-        <p:nvSpPr>
-          <p:cNvPr id="2" name="TextBox 1">
-            <a:extLst>
-              <a:ext uri="{FF2B5EF4-FFF2-40B4-BE49-F238E27FC236}">
-                <a16:creationId xmlns:a16="http://schemas.microsoft.com/office/drawing/2014/main" id="{F10855BD-AFEE-438A-A05C-98E53CA0BCBB}"/>
-              </a:ext>
-            </a:extLst>
-          </p:cNvPr>
-          <p:cNvSpPr txBox="1"/>
-          <p:nvPr/>
-        </p:nvSpPr>
-        <p:spPr>
-          <a:xfrm>
-            <a:off x="276045" y="396815"/>
-            <a:ext cx="5819955" cy="461665"/>
-          </a:xfrm>
-          <a:prstGeom prst="rect">
-            <a:avLst/>
-          </a:prstGeom>
-          <a:noFill/>
-        </p:spPr>
-        <p:txBody>
-          <a:bodyPr wrap="square" rtlCol="0">
-            <a:spAutoFit/>
-          </a:bodyPr>
-          <a:lstStyle/>
-          <a:p>
-            <a:r>
-              <a:rPr lang="en-CA" sz="2400" dirty="0"/>
-              <a:t>Colony 41 (Choice) Out-strength distributions</a:t>
-            </a:r>
-          </a:p>
-        </p:txBody>
-      </p:sp>
       <p:pic>
         <p:nvPicPr>
-          <p:cNvPr id="4" name="Picture 3">
-            <a:extLst>
-              <a:ext uri="{FF2B5EF4-FFF2-40B4-BE49-F238E27FC236}">
-                <a16:creationId xmlns:a16="http://schemas.microsoft.com/office/drawing/2014/main" id="{E8E16093-F15D-4563-A540-CEB73CC5596D}"/>
+          <p:cNvPr id="13" name="Picture 12">
+            <a:extLst>
+              <a:ext uri="{FF2B5EF4-FFF2-40B4-BE49-F238E27FC236}">
+                <a16:creationId xmlns:a16="http://schemas.microsoft.com/office/drawing/2014/main" id="{96B42C38-7A84-424D-93A9-D795B13D9218}"/>
               </a:ext>
             </a:extLst>
           </p:cNvPr>
@@ -5301,8 +5429,8 @@
         </p:blipFill>
         <p:spPr>
           <a:xfrm>
-            <a:off x="432800" y="1740695"/>
-            <a:ext cx="4011055" cy="3658620"/>
+            <a:off x="7774595" y="1795374"/>
+            <a:ext cx="3354767" cy="3267251"/>
           </a:xfrm>
           <a:prstGeom prst="rect">
             <a:avLst/>
@@ -5311,10 +5439,10 @@
       </p:pic>
       <p:pic>
         <p:nvPicPr>
-          <p:cNvPr id="6" name="Picture 5">
-            <a:extLst>
-              <a:ext uri="{FF2B5EF4-FFF2-40B4-BE49-F238E27FC236}">
-                <a16:creationId xmlns:a16="http://schemas.microsoft.com/office/drawing/2014/main" id="{AF6D2442-4A95-4598-9D2F-696B42743964}"/>
+          <p:cNvPr id="15" name="Picture 14">
+            <a:extLst>
+              <a:ext uri="{FF2B5EF4-FFF2-40B4-BE49-F238E27FC236}">
+                <a16:creationId xmlns:a16="http://schemas.microsoft.com/office/drawing/2014/main" id="{55033C64-BF9A-4C0A-8603-EDE0D309A5B6}"/>
               </a:ext>
             </a:extLst>
           </p:cNvPr>
@@ -5323,16 +5451,15 @@
           </p:cNvPicPr>
           <p:nvPr/>
         </p:nvPicPr>
-        <p:blipFill>
+        <p:blipFill rotWithShape="1">
           <a:blip r:embed="rId3"/>
-          <a:stretch>
-            <a:fillRect/>
-          </a:stretch>
+          <a:srcRect b="624"/>
+          <a:stretch/>
         </p:blipFill>
         <p:spPr>
           <a:xfrm>
-            <a:off x="4471164" y="1448120"/>
-            <a:ext cx="3445303" cy="3951195"/>
+            <a:off x="921927" y="1795376"/>
+            <a:ext cx="3286584" cy="3246888"/>
           </a:xfrm>
           <a:prstGeom prst="rect">
             <a:avLst/>
@@ -5341,10 +5468,10 @@
       </p:pic>
       <p:pic>
         <p:nvPicPr>
-          <p:cNvPr id="8" name="Picture 7">
-            <a:extLst>
-              <a:ext uri="{FF2B5EF4-FFF2-40B4-BE49-F238E27FC236}">
-                <a16:creationId xmlns:a16="http://schemas.microsoft.com/office/drawing/2014/main" id="{975C0F9A-6D2C-4A4A-BD89-BBBCCEE4CC41}"/>
+          <p:cNvPr id="17" name="Picture 16">
+            <a:extLst>
+              <a:ext uri="{FF2B5EF4-FFF2-40B4-BE49-F238E27FC236}">
+                <a16:creationId xmlns:a16="http://schemas.microsoft.com/office/drawing/2014/main" id="{A00AC703-615A-42B3-B03C-042C34A5C63D}"/>
               </a:ext>
             </a:extLst>
           </p:cNvPr>
@@ -5361,18 +5488,60 @@
         </p:blipFill>
         <p:spPr>
           <a:xfrm>
-            <a:off x="8061657" y="1572780"/>
-            <a:ext cx="3520298" cy="3864387"/>
+            <a:off x="4208510" y="1795374"/>
+            <a:ext cx="3566085" cy="3267251"/>
           </a:xfrm>
           <a:prstGeom prst="rect">
             <a:avLst/>
           </a:prstGeom>
         </p:spPr>
       </p:pic>
+      <p:sp>
+        <p:nvSpPr>
+          <p:cNvPr id="18" name="TextBox 17">
+            <a:extLst>
+              <a:ext uri="{FF2B5EF4-FFF2-40B4-BE49-F238E27FC236}">
+                <a16:creationId xmlns:a16="http://schemas.microsoft.com/office/drawing/2014/main" id="{16BC4561-7E9B-476E-A041-3D06E494B06D}"/>
+              </a:ext>
+            </a:extLst>
+          </p:cNvPr>
+          <p:cNvSpPr txBox="1"/>
+          <p:nvPr/>
+        </p:nvSpPr>
+        <p:spPr>
+          <a:xfrm>
+            <a:off x="97720" y="257478"/>
+            <a:ext cx="5819955" cy="830997"/>
+          </a:xfrm>
+          <a:prstGeom prst="rect">
+            <a:avLst/>
+          </a:prstGeom>
+          <a:noFill/>
+        </p:spPr>
+        <p:txBody>
+          <a:bodyPr wrap="square" rtlCol="0">
+            <a:spAutoFit/>
+          </a:bodyPr>
+          <a:lstStyle/>
+          <a:p>
+            <a:r>
+              <a:rPr lang="en-CA" sz="2400" dirty="0"/>
+              <a:t>Colony 41 (Choice) </a:t>
+            </a:r>
+            <a:br>
+              <a:rPr lang="en-CA" sz="2400" dirty="0"/>
+            </a:br>
+            <a:r>
+              <a:rPr lang="en-CA" sz="2400" dirty="0"/>
+              <a:t>Node size and edge width = out-strength</a:t>
+            </a:r>
+          </a:p>
+        </p:txBody>
+      </p:sp>
     </p:spTree>
     <p:extLst>
       <p:ext uri="{BB962C8B-B14F-4D97-AF65-F5344CB8AC3E}">
-        <p14:creationId xmlns:p14="http://schemas.microsoft.com/office/powerpoint/2010/main" val="3726361480"/>
+        <p14:creationId xmlns:p14="http://schemas.microsoft.com/office/powerpoint/2010/main" val="894331755"/>
       </p:ext>
     </p:extLst>
   </p:cSld>
@@ -5399,12 +5568,47 @@
           <a:chExt cx="0" cy="0"/>
         </a:xfrm>
       </p:grpSpPr>
+      <p:sp>
+        <p:nvSpPr>
+          <p:cNvPr id="2" name="TextBox 1">
+            <a:extLst>
+              <a:ext uri="{FF2B5EF4-FFF2-40B4-BE49-F238E27FC236}">
+                <a16:creationId xmlns:a16="http://schemas.microsoft.com/office/drawing/2014/main" id="{F10855BD-AFEE-438A-A05C-98E53CA0BCBB}"/>
+              </a:ext>
+            </a:extLst>
+          </p:cNvPr>
+          <p:cNvSpPr txBox="1"/>
+          <p:nvPr/>
+        </p:nvSpPr>
+        <p:spPr>
+          <a:xfrm>
+            <a:off x="276045" y="396815"/>
+            <a:ext cx="5819955" cy="461665"/>
+          </a:xfrm>
+          <a:prstGeom prst="rect">
+            <a:avLst/>
+          </a:prstGeom>
+          <a:noFill/>
+        </p:spPr>
+        <p:txBody>
+          <a:bodyPr wrap="square" rtlCol="0">
+            <a:spAutoFit/>
+          </a:bodyPr>
+          <a:lstStyle/>
+          <a:p>
+            <a:r>
+              <a:rPr lang="en-CA" sz="2400" dirty="0"/>
+              <a:t>Colony 41 (Choice) Out-strength distributions</a:t>
+            </a:r>
+          </a:p>
+        </p:txBody>
+      </p:sp>
       <p:pic>
         <p:nvPicPr>
-          <p:cNvPr id="3" name="Picture 2">
-            <a:extLst>
-              <a:ext uri="{FF2B5EF4-FFF2-40B4-BE49-F238E27FC236}">
-                <a16:creationId xmlns:a16="http://schemas.microsoft.com/office/drawing/2014/main" id="{8EB5A6EB-5D11-4975-B469-D9C55D199FAA}"/>
+          <p:cNvPr id="4" name="Picture 3">
+            <a:extLst>
+              <a:ext uri="{FF2B5EF4-FFF2-40B4-BE49-F238E27FC236}">
+                <a16:creationId xmlns:a16="http://schemas.microsoft.com/office/drawing/2014/main" id="{E8E16093-F15D-4563-A540-CEB73CC5596D}"/>
               </a:ext>
             </a:extLst>
           </p:cNvPr>
@@ -5421,8 +5625,8 @@
         </p:blipFill>
         <p:spPr>
           <a:xfrm>
-            <a:off x="1161792" y="1844753"/>
-            <a:ext cx="3247949" cy="3233252"/>
+            <a:off x="432800" y="1740695"/>
+            <a:ext cx="4011055" cy="3658620"/>
           </a:xfrm>
           <a:prstGeom prst="rect">
             <a:avLst/>
@@ -5431,10 +5635,10 @@
       </p:pic>
       <p:pic>
         <p:nvPicPr>
-          <p:cNvPr id="5" name="Picture 4">
-            <a:extLst>
-              <a:ext uri="{FF2B5EF4-FFF2-40B4-BE49-F238E27FC236}">
-                <a16:creationId xmlns:a16="http://schemas.microsoft.com/office/drawing/2014/main" id="{1C6674CB-0805-427F-B2AE-84AEAEC3BE33}"/>
+          <p:cNvPr id="6" name="Picture 5">
+            <a:extLst>
+              <a:ext uri="{FF2B5EF4-FFF2-40B4-BE49-F238E27FC236}">
+                <a16:creationId xmlns:a16="http://schemas.microsoft.com/office/drawing/2014/main" id="{AF6D2442-4A95-4598-9D2F-696B42743964}"/>
               </a:ext>
             </a:extLst>
           </p:cNvPr>
@@ -5451,8 +5655,8 @@
         </p:blipFill>
         <p:spPr>
           <a:xfrm>
-            <a:off x="4515394" y="1844752"/>
-            <a:ext cx="3161212" cy="3168495"/>
+            <a:off x="4471164" y="1448120"/>
+            <a:ext cx="3445303" cy="3951195"/>
           </a:xfrm>
           <a:prstGeom prst="rect">
             <a:avLst/>
@@ -5461,10 +5665,10 @@
       </p:pic>
       <p:pic>
         <p:nvPicPr>
-          <p:cNvPr id="7" name="Picture 6">
-            <a:extLst>
-              <a:ext uri="{FF2B5EF4-FFF2-40B4-BE49-F238E27FC236}">
-                <a16:creationId xmlns:a16="http://schemas.microsoft.com/office/drawing/2014/main" id="{AEF3B082-E494-414C-89D4-7C65646EDAA8}"/>
+          <p:cNvPr id="8" name="Picture 7">
+            <a:extLst>
+              <a:ext uri="{FF2B5EF4-FFF2-40B4-BE49-F238E27FC236}">
+                <a16:creationId xmlns:a16="http://schemas.microsoft.com/office/drawing/2014/main" id="{975C0F9A-6D2C-4A4A-BD89-BBBCCEE4CC41}"/>
               </a:ext>
             </a:extLst>
           </p:cNvPr>
@@ -5481,60 +5685,18 @@
         </p:blipFill>
         <p:spPr>
           <a:xfrm>
-            <a:off x="7782259" y="1844752"/>
-            <a:ext cx="3204748" cy="3168495"/>
+            <a:off x="8061657" y="1572780"/>
+            <a:ext cx="3520298" cy="3864387"/>
           </a:xfrm>
           <a:prstGeom prst="rect">
             <a:avLst/>
           </a:prstGeom>
         </p:spPr>
       </p:pic>
-      <p:sp>
-        <p:nvSpPr>
-          <p:cNvPr id="8" name="TextBox 7">
-            <a:extLst>
-              <a:ext uri="{FF2B5EF4-FFF2-40B4-BE49-F238E27FC236}">
-                <a16:creationId xmlns:a16="http://schemas.microsoft.com/office/drawing/2014/main" id="{154644AB-A9E6-44F6-BDB0-D0C431C80D7E}"/>
-              </a:ext>
-            </a:extLst>
-          </p:cNvPr>
-          <p:cNvSpPr txBox="1"/>
-          <p:nvPr/>
-        </p:nvSpPr>
-        <p:spPr>
-          <a:xfrm>
-            <a:off x="97720" y="257478"/>
-            <a:ext cx="5819955" cy="830997"/>
-          </a:xfrm>
-          <a:prstGeom prst="rect">
-            <a:avLst/>
-          </a:prstGeom>
-          <a:noFill/>
-        </p:spPr>
-        <p:txBody>
-          <a:bodyPr wrap="square" rtlCol="0">
-            <a:spAutoFit/>
-          </a:bodyPr>
-          <a:lstStyle/>
-          <a:p>
-            <a:r>
-              <a:rPr lang="en-CA" sz="2400" dirty="0"/>
-              <a:t>Colony 53 (Choice) </a:t>
-            </a:r>
-            <a:br>
-              <a:rPr lang="en-CA" sz="2400" dirty="0"/>
-            </a:br>
-            <a:r>
-              <a:rPr lang="en-CA" sz="2400" dirty="0"/>
-              <a:t>Node size and edge width = out-strength</a:t>
-            </a:r>
-          </a:p>
-        </p:txBody>
-      </p:sp>
     </p:spTree>
     <p:extLst>
       <p:ext uri="{BB962C8B-B14F-4D97-AF65-F5344CB8AC3E}">
-        <p14:creationId xmlns:p14="http://schemas.microsoft.com/office/powerpoint/2010/main" val="1390489208"/>
+        <p14:creationId xmlns:p14="http://schemas.microsoft.com/office/powerpoint/2010/main" val="3726361480"/>
       </p:ext>
     </p:extLst>
   </p:cSld>
@@ -5561,47 +5723,12 @@
           <a:chExt cx="0" cy="0"/>
         </a:xfrm>
       </p:grpSpPr>
-      <p:sp>
-        <p:nvSpPr>
-          <p:cNvPr id="2" name="TextBox 1">
-            <a:extLst>
-              <a:ext uri="{FF2B5EF4-FFF2-40B4-BE49-F238E27FC236}">
-                <a16:creationId xmlns:a16="http://schemas.microsoft.com/office/drawing/2014/main" id="{15472C81-D789-4592-AEF6-7B747860E6F3}"/>
-              </a:ext>
-            </a:extLst>
-          </p:cNvPr>
-          <p:cNvSpPr txBox="1"/>
-          <p:nvPr/>
-        </p:nvSpPr>
-        <p:spPr>
-          <a:xfrm>
-            <a:off x="276045" y="396815"/>
-            <a:ext cx="5819955" cy="461665"/>
-          </a:xfrm>
-          <a:prstGeom prst="rect">
-            <a:avLst/>
-          </a:prstGeom>
-          <a:noFill/>
-        </p:spPr>
-        <p:txBody>
-          <a:bodyPr wrap="square" rtlCol="0">
-            <a:spAutoFit/>
-          </a:bodyPr>
-          <a:lstStyle/>
-          <a:p>
-            <a:r>
-              <a:rPr lang="en-CA" sz="2400" dirty="0"/>
-              <a:t>Colony 53 (Choice) Out-strength distributions</a:t>
-            </a:r>
-          </a:p>
-        </p:txBody>
-      </p:sp>
       <p:pic>
         <p:nvPicPr>
-          <p:cNvPr id="4" name="Picture 3">
-            <a:extLst>
-              <a:ext uri="{FF2B5EF4-FFF2-40B4-BE49-F238E27FC236}">
-                <a16:creationId xmlns:a16="http://schemas.microsoft.com/office/drawing/2014/main" id="{41B3C44E-EE41-49A6-9FEF-DC5F980D1515}"/>
+          <p:cNvPr id="3" name="Picture 2">
+            <a:extLst>
+              <a:ext uri="{FF2B5EF4-FFF2-40B4-BE49-F238E27FC236}">
+                <a16:creationId xmlns:a16="http://schemas.microsoft.com/office/drawing/2014/main" id="{8EB5A6EB-5D11-4975-B469-D9C55D199FAA}"/>
               </a:ext>
             </a:extLst>
           </p:cNvPr>
@@ -5610,15 +5737,16 @@
           </p:cNvPicPr>
           <p:nvPr/>
         </p:nvPicPr>
-        <p:blipFill rotWithShape="1">
+        <p:blipFill>
           <a:blip r:embed="rId2"/>
-          <a:srcRect r="27424"/>
-          <a:stretch/>
+          <a:stretch>
+            <a:fillRect/>
+          </a:stretch>
         </p:blipFill>
         <p:spPr>
           <a:xfrm>
-            <a:off x="543749" y="1688633"/>
-            <a:ext cx="3513680" cy="3510169"/>
+            <a:off x="1161792" y="1844753"/>
+            <a:ext cx="3247949" cy="3233252"/>
           </a:xfrm>
           <a:prstGeom prst="rect">
             <a:avLst/>
@@ -5627,10 +5755,10 @@
       </p:pic>
       <p:pic>
         <p:nvPicPr>
-          <p:cNvPr id="6" name="Picture 5">
-            <a:extLst>
-              <a:ext uri="{FF2B5EF4-FFF2-40B4-BE49-F238E27FC236}">
-                <a16:creationId xmlns:a16="http://schemas.microsoft.com/office/drawing/2014/main" id="{CC7F1287-1257-414F-8080-2CE52D1352E4}"/>
+          <p:cNvPr id="5" name="Picture 4">
+            <a:extLst>
+              <a:ext uri="{FF2B5EF4-FFF2-40B4-BE49-F238E27FC236}">
+                <a16:creationId xmlns:a16="http://schemas.microsoft.com/office/drawing/2014/main" id="{1C6674CB-0805-427F-B2AE-84AEAEC3BE33}"/>
               </a:ext>
             </a:extLst>
           </p:cNvPr>
@@ -5639,15 +5767,16 @@
           </p:cNvPicPr>
           <p:nvPr/>
         </p:nvPicPr>
-        <p:blipFill rotWithShape="1">
+        <p:blipFill>
           <a:blip r:embed="rId3"/>
-          <a:srcRect r="14791"/>
-          <a:stretch/>
+          <a:stretch>
+            <a:fillRect/>
+          </a:stretch>
         </p:blipFill>
         <p:spPr>
           <a:xfrm>
-            <a:off x="4314524" y="1595016"/>
-            <a:ext cx="3342685" cy="3667966"/>
+            <a:off x="4515394" y="1844752"/>
+            <a:ext cx="3161212" cy="3168495"/>
           </a:xfrm>
           <a:prstGeom prst="rect">
             <a:avLst/>
@@ -5656,10 +5785,10 @@
       </p:pic>
       <p:pic>
         <p:nvPicPr>
-          <p:cNvPr id="8" name="Picture 7">
-            <a:extLst>
-              <a:ext uri="{FF2B5EF4-FFF2-40B4-BE49-F238E27FC236}">
-                <a16:creationId xmlns:a16="http://schemas.microsoft.com/office/drawing/2014/main" id="{80EAB107-8CF6-4CB0-B26A-43725C29DA3B}"/>
+          <p:cNvPr id="7" name="Picture 6">
+            <a:extLst>
+              <a:ext uri="{FF2B5EF4-FFF2-40B4-BE49-F238E27FC236}">
+                <a16:creationId xmlns:a16="http://schemas.microsoft.com/office/drawing/2014/main" id="{AEF3B082-E494-414C-89D4-7C65646EDAA8}"/>
               </a:ext>
             </a:extLst>
           </p:cNvPr>
@@ -5676,18 +5805,60 @@
         </p:blipFill>
         <p:spPr>
           <a:xfrm>
-            <a:off x="7689112" y="1595016"/>
-            <a:ext cx="3537259" cy="3667966"/>
+            <a:off x="7782259" y="1844752"/>
+            <a:ext cx="3204748" cy="3168495"/>
           </a:xfrm>
           <a:prstGeom prst="rect">
             <a:avLst/>
           </a:prstGeom>
         </p:spPr>
       </p:pic>
+      <p:sp>
+        <p:nvSpPr>
+          <p:cNvPr id="8" name="TextBox 7">
+            <a:extLst>
+              <a:ext uri="{FF2B5EF4-FFF2-40B4-BE49-F238E27FC236}">
+                <a16:creationId xmlns:a16="http://schemas.microsoft.com/office/drawing/2014/main" id="{154644AB-A9E6-44F6-BDB0-D0C431C80D7E}"/>
+              </a:ext>
+            </a:extLst>
+          </p:cNvPr>
+          <p:cNvSpPr txBox="1"/>
+          <p:nvPr/>
+        </p:nvSpPr>
+        <p:spPr>
+          <a:xfrm>
+            <a:off x="97720" y="257478"/>
+            <a:ext cx="5819955" cy="830997"/>
+          </a:xfrm>
+          <a:prstGeom prst="rect">
+            <a:avLst/>
+          </a:prstGeom>
+          <a:noFill/>
+        </p:spPr>
+        <p:txBody>
+          <a:bodyPr wrap="square" rtlCol="0">
+            <a:spAutoFit/>
+          </a:bodyPr>
+          <a:lstStyle/>
+          <a:p>
+            <a:r>
+              <a:rPr lang="en-CA" sz="2400" dirty="0"/>
+              <a:t>Colony 53 (Choice) </a:t>
+            </a:r>
+            <a:br>
+              <a:rPr lang="en-CA" sz="2400" dirty="0"/>
+            </a:br>
+            <a:r>
+              <a:rPr lang="en-CA" sz="2400" dirty="0"/>
+              <a:t>Node size and edge width = out-strength</a:t>
+            </a:r>
+          </a:p>
+        </p:txBody>
+      </p:sp>
     </p:spTree>
     <p:extLst>
       <p:ext uri="{BB962C8B-B14F-4D97-AF65-F5344CB8AC3E}">
-        <p14:creationId xmlns:p14="http://schemas.microsoft.com/office/powerpoint/2010/main" val="2586672540"/>
+        <p14:creationId xmlns:p14="http://schemas.microsoft.com/office/powerpoint/2010/main" val="1390489208"/>
       </p:ext>
     </p:extLst>
   </p:cSld>
@@ -5714,12 +5885,47 @@
           <a:chExt cx="0" cy="0"/>
         </a:xfrm>
       </p:grpSpPr>
+      <p:sp>
+        <p:nvSpPr>
+          <p:cNvPr id="2" name="TextBox 1">
+            <a:extLst>
+              <a:ext uri="{FF2B5EF4-FFF2-40B4-BE49-F238E27FC236}">
+                <a16:creationId xmlns:a16="http://schemas.microsoft.com/office/drawing/2014/main" id="{15472C81-D789-4592-AEF6-7B747860E6F3}"/>
+              </a:ext>
+            </a:extLst>
+          </p:cNvPr>
+          <p:cNvSpPr txBox="1"/>
+          <p:nvPr/>
+        </p:nvSpPr>
+        <p:spPr>
+          <a:xfrm>
+            <a:off x="276045" y="396815"/>
+            <a:ext cx="5819955" cy="461665"/>
+          </a:xfrm>
+          <a:prstGeom prst="rect">
+            <a:avLst/>
+          </a:prstGeom>
+          <a:noFill/>
+        </p:spPr>
+        <p:txBody>
+          <a:bodyPr wrap="square" rtlCol="0">
+            <a:spAutoFit/>
+          </a:bodyPr>
+          <a:lstStyle/>
+          <a:p>
+            <a:r>
+              <a:rPr lang="en-CA" sz="2400" dirty="0"/>
+              <a:t>Colony 53 (Choice) Out-strength distributions</a:t>
+            </a:r>
+          </a:p>
+        </p:txBody>
+      </p:sp>
       <p:pic>
         <p:nvPicPr>
-          <p:cNvPr id="3" name="Picture 2">
-            <a:extLst>
-              <a:ext uri="{FF2B5EF4-FFF2-40B4-BE49-F238E27FC236}">
-                <a16:creationId xmlns:a16="http://schemas.microsoft.com/office/drawing/2014/main" id="{A0D58741-9B07-4E36-AC29-7B9A949B35CF}"/>
+          <p:cNvPr id="4" name="Picture 3">
+            <a:extLst>
+              <a:ext uri="{FF2B5EF4-FFF2-40B4-BE49-F238E27FC236}">
+                <a16:creationId xmlns:a16="http://schemas.microsoft.com/office/drawing/2014/main" id="{41B3C44E-EE41-49A6-9FEF-DC5F980D1515}"/>
               </a:ext>
             </a:extLst>
           </p:cNvPr>
@@ -5728,16 +5934,15 @@
           </p:cNvPicPr>
           <p:nvPr/>
         </p:nvPicPr>
-        <p:blipFill>
+        <p:blipFill rotWithShape="1">
           <a:blip r:embed="rId2"/>
-          <a:stretch>
-            <a:fillRect/>
-          </a:stretch>
+          <a:srcRect r="27424"/>
+          <a:stretch/>
         </p:blipFill>
         <p:spPr>
           <a:xfrm>
-            <a:off x="983901" y="1748850"/>
-            <a:ext cx="3277057" cy="3029373"/>
+            <a:off x="543749" y="1688633"/>
+            <a:ext cx="3513680" cy="3510169"/>
           </a:xfrm>
           <a:prstGeom prst="rect">
             <a:avLst/>
@@ -5746,10 +5951,10 @@
       </p:pic>
       <p:pic>
         <p:nvPicPr>
-          <p:cNvPr id="7" name="Picture 6">
-            <a:extLst>
-              <a:ext uri="{FF2B5EF4-FFF2-40B4-BE49-F238E27FC236}">
-                <a16:creationId xmlns:a16="http://schemas.microsoft.com/office/drawing/2014/main" id="{A9571C71-A87D-4C1C-9BCF-A3C8003CBB3A}"/>
+          <p:cNvPr id="6" name="Picture 5">
+            <a:extLst>
+              <a:ext uri="{FF2B5EF4-FFF2-40B4-BE49-F238E27FC236}">
+                <a16:creationId xmlns:a16="http://schemas.microsoft.com/office/drawing/2014/main" id="{CC7F1287-1257-414F-8080-2CE52D1352E4}"/>
               </a:ext>
             </a:extLst>
           </p:cNvPr>
@@ -5758,16 +5963,15 @@
           </p:cNvPicPr>
           <p:nvPr/>
         </p:nvPicPr>
-        <p:blipFill>
+        <p:blipFill rotWithShape="1">
           <a:blip r:embed="rId3"/>
-          <a:stretch>
-            <a:fillRect/>
-          </a:stretch>
+          <a:srcRect r="14791"/>
+          <a:stretch/>
         </p:blipFill>
         <p:spPr>
           <a:xfrm>
-            <a:off x="7810623" y="1748850"/>
-            <a:ext cx="3175808" cy="3029373"/>
+            <a:off x="4314524" y="1595016"/>
+            <a:ext cx="3342685" cy="3667966"/>
           </a:xfrm>
           <a:prstGeom prst="rect">
             <a:avLst/>
@@ -5776,10 +5980,10 @@
       </p:pic>
       <p:pic>
         <p:nvPicPr>
-          <p:cNvPr id="9" name="Picture 8">
-            <a:extLst>
-              <a:ext uri="{FF2B5EF4-FFF2-40B4-BE49-F238E27FC236}">
-                <a16:creationId xmlns:a16="http://schemas.microsoft.com/office/drawing/2014/main" id="{B0AAFE15-C099-47C1-A10E-82E5105D23F2}"/>
+          <p:cNvPr id="8" name="Picture 7">
+            <a:extLst>
+              <a:ext uri="{FF2B5EF4-FFF2-40B4-BE49-F238E27FC236}">
+                <a16:creationId xmlns:a16="http://schemas.microsoft.com/office/drawing/2014/main" id="{80EAB107-8CF6-4CB0-B26A-43725C29DA3B}"/>
               </a:ext>
             </a:extLst>
           </p:cNvPr>
@@ -5796,60 +6000,18 @@
         </p:blipFill>
         <p:spPr>
           <a:xfrm>
-            <a:off x="4363026" y="1748850"/>
-            <a:ext cx="3240722" cy="2990059"/>
+            <a:off x="7689112" y="1595016"/>
+            <a:ext cx="3537259" cy="3667966"/>
           </a:xfrm>
           <a:prstGeom prst="rect">
             <a:avLst/>
           </a:prstGeom>
         </p:spPr>
       </p:pic>
-      <p:sp>
-        <p:nvSpPr>
-          <p:cNvPr id="10" name="TextBox 9">
-            <a:extLst>
-              <a:ext uri="{FF2B5EF4-FFF2-40B4-BE49-F238E27FC236}">
-                <a16:creationId xmlns:a16="http://schemas.microsoft.com/office/drawing/2014/main" id="{B82E68FD-A873-46FB-9E59-C912140D82B5}"/>
-              </a:ext>
-            </a:extLst>
-          </p:cNvPr>
-          <p:cNvSpPr txBox="1"/>
-          <p:nvPr/>
-        </p:nvSpPr>
-        <p:spPr>
-          <a:xfrm>
-            <a:off x="97720" y="257478"/>
-            <a:ext cx="5819955" cy="830997"/>
-          </a:xfrm>
-          <a:prstGeom prst="rect">
-            <a:avLst/>
-          </a:prstGeom>
-          <a:noFill/>
-        </p:spPr>
-        <p:txBody>
-          <a:bodyPr wrap="square" rtlCol="0">
-            <a:spAutoFit/>
-          </a:bodyPr>
-          <a:lstStyle/>
-          <a:p>
-            <a:r>
-              <a:rPr lang="en-CA" sz="2400" dirty="0"/>
-              <a:t>Colony 60 (No-Choice) </a:t>
-            </a:r>
-            <a:br>
-              <a:rPr lang="en-CA" sz="2400" dirty="0"/>
-            </a:br>
-            <a:r>
-              <a:rPr lang="en-CA" sz="2400" dirty="0"/>
-              <a:t>Node size and edge width = out-strength</a:t>
-            </a:r>
-          </a:p>
-        </p:txBody>
-      </p:sp>
     </p:spTree>
     <p:extLst>
       <p:ext uri="{BB962C8B-B14F-4D97-AF65-F5344CB8AC3E}">
-        <p14:creationId xmlns:p14="http://schemas.microsoft.com/office/powerpoint/2010/main" val="3610900390"/>
+        <p14:creationId xmlns:p14="http://schemas.microsoft.com/office/powerpoint/2010/main" val="2586672540"/>
       </p:ext>
     </p:extLst>
   </p:cSld>

</xml_diff>